<commit_message>
feat(module12): SDM final submission
</commit_message>
<xml_diff>
--- a/T1-SDM/assignments/Assessment_4/SDM404_Faria_L_Assessment_4_SlideDeck.pptx
+++ b/T1-SDM/assignments/Assessment_4/SDM404_Faria_L_Assessment_4_SlideDeck.pptx
@@ -123,1939 +123,9 @@
 <file path=ppt/revisionInfo.xml><?xml version="1.0" encoding="utf-8"?>
 <p1510:revInfo xmlns:a="http://schemas.openxmlformats.org/drawingml/2006/main" xmlns:r="http://schemas.openxmlformats.org/officeDocument/2006/relationships" xmlns:p1510="http://schemas.microsoft.com/office/powerpoint/2015/10/main">
   <p1510:revLst>
-    <p1510:client id="{B6554E97-654E-F047-A081-3F6DD18F8C3B}" v="1592" dt="2025-08-13T09:26:01.319"/>
+    <p1510:client id="{9E536166-7E9D-ED7A-8BDD-4314A975467C}" v="26" dt="2025-08-17T06:47:32.561"/>
   </p1510:revLst>
 </p1510:revInfo>
-</file>
-
-<file path=ppt/changesInfos/changesInfo1.xml><?xml version="1.0" encoding="utf-8"?>
-<pc:chgInfo xmlns:a="http://schemas.openxmlformats.org/drawingml/2006/main" xmlns:r="http://schemas.openxmlformats.org/officeDocument/2006/relationships" xmlns:ac="http://schemas.microsoft.com/office/drawing/2013/main/command" xmlns:pc="http://schemas.microsoft.com/office/powerpoint/2013/main/command">
-  <pc:docChgLst>
-    <pc:chgData name="Luis guilherme De barros andrade faria" userId="S::luis.faria@student.torrens.edu.au::31e40991-e7d9-41d2-8af0-eeeeb0b0a000" providerId="AD" clId="Web-{10892CEB-547D-0641-B21D-9C6144283A02}"/>
-    <pc:docChg chg="addSld modSld addMainMaster delMainMaster">
-      <pc:chgData name="Luis guilherme De barros andrade faria" userId="S::luis.faria@student.torrens.edu.au::31e40991-e7d9-41d2-8af0-eeeeb0b0a000" providerId="AD" clId="Web-{10892CEB-547D-0641-B21D-9C6144283A02}" dt="2025-07-30T09:12:21.692" v="132" actId="20577"/>
-      <pc:docMkLst>
-        <pc:docMk/>
-      </pc:docMkLst>
-      <pc:sldChg chg="addSp modSp mod setBg modClrScheme chgLayout">
-        <pc:chgData name="Luis guilherme De barros andrade faria" userId="S::luis.faria@student.torrens.edu.au::31e40991-e7d9-41d2-8af0-eeeeb0b0a000" providerId="AD" clId="Web-{10892CEB-547D-0641-B21D-9C6144283A02}" dt="2025-07-30T09:10:47.455" v="72" actId="20577"/>
-        <pc:sldMkLst>
-          <pc:docMk/>
-          <pc:sldMk cId="109857222" sldId="256"/>
-        </pc:sldMkLst>
-        <pc:spChg chg="mod">
-          <ac:chgData name="Luis guilherme De barros andrade faria" userId="S::luis.faria@student.torrens.edu.au::31e40991-e7d9-41d2-8af0-eeeeb0b0a000" providerId="AD" clId="Web-{10892CEB-547D-0641-B21D-9C6144283A02}" dt="2025-07-30T09:10:47.455" v="72" actId="20577"/>
-          <ac:spMkLst>
-            <pc:docMk/>
-            <pc:sldMk cId="109857222" sldId="256"/>
-            <ac:spMk id="2" creationId="{00000000-0000-0000-0000-000000000000}"/>
-          </ac:spMkLst>
-        </pc:spChg>
-        <pc:spChg chg="mod">
-          <ac:chgData name="Luis guilherme De barros andrade faria" userId="S::luis.faria@student.torrens.edu.au::31e40991-e7d9-41d2-8af0-eeeeb0b0a000" providerId="AD" clId="Web-{10892CEB-547D-0641-B21D-9C6144283A02}" dt="2025-07-30T09:10:39.564" v="70" actId="20577"/>
-          <ac:spMkLst>
-            <pc:docMk/>
-            <pc:sldMk cId="109857222" sldId="256"/>
-            <ac:spMk id="3" creationId="{00000000-0000-0000-0000-000000000000}"/>
-          </ac:spMkLst>
-        </pc:spChg>
-      </pc:sldChg>
-      <pc:sldChg chg="modSp new">
-        <pc:chgData name="Luis guilherme De barros andrade faria" userId="S::luis.faria@student.torrens.edu.au::31e40991-e7d9-41d2-8af0-eeeeb0b0a000" providerId="AD" clId="Web-{10892CEB-547D-0641-B21D-9C6144283A02}" dt="2025-07-30T09:11:10.127" v="83" actId="20577"/>
-        <pc:sldMkLst>
-          <pc:docMk/>
-          <pc:sldMk cId="289368279" sldId="257"/>
-        </pc:sldMkLst>
-        <pc:spChg chg="mod">
-          <ac:chgData name="Luis guilherme De barros andrade faria" userId="S::luis.faria@student.torrens.edu.au::31e40991-e7d9-41d2-8af0-eeeeb0b0a000" providerId="AD" clId="Web-{10892CEB-547D-0641-B21D-9C6144283A02}" dt="2025-07-30T09:11:10.127" v="83" actId="20577"/>
-          <ac:spMkLst>
-            <pc:docMk/>
-            <pc:sldMk cId="289368279" sldId="257"/>
-            <ac:spMk id="2" creationId="{33AA03FC-5505-7C29-91D2-1738A46F72D2}"/>
-          </ac:spMkLst>
-        </pc:spChg>
-      </pc:sldChg>
-      <pc:sldChg chg="modSp add replId">
-        <pc:chgData name="Luis guilherme De barros andrade faria" userId="S::luis.faria@student.torrens.edu.au::31e40991-e7d9-41d2-8af0-eeeeb0b0a000" providerId="AD" clId="Web-{10892CEB-547D-0641-B21D-9C6144283A02}" dt="2025-07-30T09:11:22.487" v="90" actId="20577"/>
-        <pc:sldMkLst>
-          <pc:docMk/>
-          <pc:sldMk cId="1725121888" sldId="258"/>
-        </pc:sldMkLst>
-        <pc:spChg chg="mod">
-          <ac:chgData name="Luis guilherme De barros andrade faria" userId="S::luis.faria@student.torrens.edu.au::31e40991-e7d9-41d2-8af0-eeeeb0b0a000" providerId="AD" clId="Web-{10892CEB-547D-0641-B21D-9C6144283A02}" dt="2025-07-30T09:11:22.487" v="90" actId="20577"/>
-          <ac:spMkLst>
-            <pc:docMk/>
-            <pc:sldMk cId="1725121888" sldId="258"/>
-            <ac:spMk id="2" creationId="{69D5A3DE-C092-5A5F-76EE-290B91BC7F37}"/>
-          </ac:spMkLst>
-        </pc:spChg>
-      </pc:sldChg>
-      <pc:sldChg chg="modSp add replId">
-        <pc:chgData name="Luis guilherme De barros andrade faria" userId="S::luis.faria@student.torrens.edu.au::31e40991-e7d9-41d2-8af0-eeeeb0b0a000" providerId="AD" clId="Web-{10892CEB-547D-0641-B21D-9C6144283A02}" dt="2025-07-30T09:11:32.659" v="95" actId="20577"/>
-        <pc:sldMkLst>
-          <pc:docMk/>
-          <pc:sldMk cId="2969302973" sldId="259"/>
-        </pc:sldMkLst>
-        <pc:spChg chg="mod">
-          <ac:chgData name="Luis guilherme De barros andrade faria" userId="S::luis.faria@student.torrens.edu.au::31e40991-e7d9-41d2-8af0-eeeeb0b0a000" providerId="AD" clId="Web-{10892CEB-547D-0641-B21D-9C6144283A02}" dt="2025-07-30T09:11:32.659" v="95" actId="20577"/>
-          <ac:spMkLst>
-            <pc:docMk/>
-            <pc:sldMk cId="2969302973" sldId="259"/>
-            <ac:spMk id="2" creationId="{880AAC80-1A7F-39FF-058B-780D98CC22AF}"/>
-          </ac:spMkLst>
-        </pc:spChg>
-      </pc:sldChg>
-      <pc:sldChg chg="modSp add replId">
-        <pc:chgData name="Luis guilherme De barros andrade faria" userId="S::luis.faria@student.torrens.edu.au::31e40991-e7d9-41d2-8af0-eeeeb0b0a000" providerId="AD" clId="Web-{10892CEB-547D-0641-B21D-9C6144283A02}" dt="2025-07-30T09:11:41.269" v="98" actId="20577"/>
-        <pc:sldMkLst>
-          <pc:docMk/>
-          <pc:sldMk cId="156018877" sldId="260"/>
-        </pc:sldMkLst>
-        <pc:spChg chg="mod">
-          <ac:chgData name="Luis guilherme De barros andrade faria" userId="S::luis.faria@student.torrens.edu.au::31e40991-e7d9-41d2-8af0-eeeeb0b0a000" providerId="AD" clId="Web-{10892CEB-547D-0641-B21D-9C6144283A02}" dt="2025-07-30T09:11:41.269" v="98" actId="20577"/>
-          <ac:spMkLst>
-            <pc:docMk/>
-            <pc:sldMk cId="156018877" sldId="260"/>
-            <ac:spMk id="2" creationId="{95B6250B-0DB2-6DBF-6048-D67F8068EEBC}"/>
-          </ac:spMkLst>
-        </pc:spChg>
-      </pc:sldChg>
-      <pc:sldChg chg="modSp add replId">
-        <pc:chgData name="Luis guilherme De barros andrade faria" userId="S::luis.faria@student.torrens.edu.au::31e40991-e7d9-41d2-8af0-eeeeb0b0a000" providerId="AD" clId="Web-{10892CEB-547D-0641-B21D-9C6144283A02}" dt="2025-07-30T09:11:50.191" v="106" actId="20577"/>
-        <pc:sldMkLst>
-          <pc:docMk/>
-          <pc:sldMk cId="1083875465" sldId="261"/>
-        </pc:sldMkLst>
-        <pc:spChg chg="mod">
-          <ac:chgData name="Luis guilherme De barros andrade faria" userId="S::luis.faria@student.torrens.edu.au::31e40991-e7d9-41d2-8af0-eeeeb0b0a000" providerId="AD" clId="Web-{10892CEB-547D-0641-B21D-9C6144283A02}" dt="2025-07-30T09:11:50.191" v="106" actId="20577"/>
-          <ac:spMkLst>
-            <pc:docMk/>
-            <pc:sldMk cId="1083875465" sldId="261"/>
-            <ac:spMk id="2" creationId="{0F13DB09-CB71-EE4C-BA4D-E6FF35A4CF9A}"/>
-          </ac:spMkLst>
-        </pc:spChg>
-      </pc:sldChg>
-      <pc:sldChg chg="modSp add replId">
-        <pc:chgData name="Luis guilherme De barros andrade faria" userId="S::luis.faria@student.torrens.edu.au::31e40991-e7d9-41d2-8af0-eeeeb0b0a000" providerId="AD" clId="Web-{10892CEB-547D-0641-B21D-9C6144283A02}" dt="2025-07-30T09:11:57.847" v="118" actId="20577"/>
-        <pc:sldMkLst>
-          <pc:docMk/>
-          <pc:sldMk cId="2354179793" sldId="262"/>
-        </pc:sldMkLst>
-        <pc:spChg chg="mod">
-          <ac:chgData name="Luis guilherme De barros andrade faria" userId="S::luis.faria@student.torrens.edu.au::31e40991-e7d9-41d2-8af0-eeeeb0b0a000" providerId="AD" clId="Web-{10892CEB-547D-0641-B21D-9C6144283A02}" dt="2025-07-30T09:11:57.847" v="118" actId="20577"/>
-          <ac:spMkLst>
-            <pc:docMk/>
-            <pc:sldMk cId="2354179793" sldId="262"/>
-            <ac:spMk id="2" creationId="{955AA314-AE02-4230-8EE1-5D7B0D6D4ACB}"/>
-          </ac:spMkLst>
-        </pc:spChg>
-      </pc:sldChg>
-      <pc:sldChg chg="modSp add replId">
-        <pc:chgData name="Luis guilherme De barros andrade faria" userId="S::luis.faria@student.torrens.edu.au::31e40991-e7d9-41d2-8af0-eeeeb0b0a000" providerId="AD" clId="Web-{10892CEB-547D-0641-B21D-9C6144283A02}" dt="2025-07-30T09:12:13.504" v="123" actId="20577"/>
-        <pc:sldMkLst>
-          <pc:docMk/>
-          <pc:sldMk cId="2107877928" sldId="263"/>
-        </pc:sldMkLst>
-        <pc:spChg chg="mod">
-          <ac:chgData name="Luis guilherme De barros andrade faria" userId="S::luis.faria@student.torrens.edu.au::31e40991-e7d9-41d2-8af0-eeeeb0b0a000" providerId="AD" clId="Web-{10892CEB-547D-0641-B21D-9C6144283A02}" dt="2025-07-30T09:12:13.504" v="123" actId="20577"/>
-          <ac:spMkLst>
-            <pc:docMk/>
-            <pc:sldMk cId="2107877928" sldId="263"/>
-            <ac:spMk id="2" creationId="{BEB1A209-7396-5E9E-DC76-D97DEBADA539}"/>
-          </ac:spMkLst>
-        </pc:spChg>
-      </pc:sldChg>
-      <pc:sldChg chg="modSp add replId">
-        <pc:chgData name="Luis guilherme De barros andrade faria" userId="S::luis.faria@student.torrens.edu.au::31e40991-e7d9-41d2-8af0-eeeeb0b0a000" providerId="AD" clId="Web-{10892CEB-547D-0641-B21D-9C6144283A02}" dt="2025-07-30T09:12:21.692" v="132" actId="20577"/>
-        <pc:sldMkLst>
-          <pc:docMk/>
-          <pc:sldMk cId="341832275" sldId="264"/>
-        </pc:sldMkLst>
-      </pc:sldChg>
-      <pc:sldMasterChg chg="del delSldLayout">
-        <pc:chgData name="Luis guilherme De barros andrade faria" userId="S::luis.faria@student.torrens.edu.au::31e40991-e7d9-41d2-8af0-eeeeb0b0a000" providerId="AD" clId="Web-{10892CEB-547D-0641-B21D-9C6144283A02}" dt="2025-07-30T09:08:38.872" v="0"/>
-        <pc:sldMasterMkLst>
-          <pc:docMk/>
-          <pc:sldMasterMk cId="2460954070" sldId="2147483660"/>
-        </pc:sldMasterMkLst>
-        <pc:sldLayoutChg chg="del">
-          <pc:chgData name="Luis guilherme De barros andrade faria" userId="S::luis.faria@student.torrens.edu.au::31e40991-e7d9-41d2-8af0-eeeeb0b0a000" providerId="AD" clId="Web-{10892CEB-547D-0641-B21D-9C6144283A02}" dt="2025-07-30T09:08:38.872" v="0"/>
-          <pc:sldLayoutMkLst>
-            <pc:docMk/>
-            <pc:sldMasterMk cId="2460954070" sldId="2147483660"/>
-            <pc:sldLayoutMk cId="2385387890" sldId="2147483661"/>
-          </pc:sldLayoutMkLst>
-        </pc:sldLayoutChg>
-        <pc:sldLayoutChg chg="del">
-          <pc:chgData name="Luis guilherme De barros andrade faria" userId="S::luis.faria@student.torrens.edu.au::31e40991-e7d9-41d2-8af0-eeeeb0b0a000" providerId="AD" clId="Web-{10892CEB-547D-0641-B21D-9C6144283A02}" dt="2025-07-30T09:08:38.872" v="0"/>
-          <pc:sldLayoutMkLst>
-            <pc:docMk/>
-            <pc:sldMasterMk cId="2460954070" sldId="2147483660"/>
-            <pc:sldLayoutMk cId="949138452" sldId="2147483662"/>
-          </pc:sldLayoutMkLst>
-        </pc:sldLayoutChg>
-        <pc:sldLayoutChg chg="del">
-          <pc:chgData name="Luis guilherme De barros andrade faria" userId="S::luis.faria@student.torrens.edu.au::31e40991-e7d9-41d2-8af0-eeeeb0b0a000" providerId="AD" clId="Web-{10892CEB-547D-0641-B21D-9C6144283A02}" dt="2025-07-30T09:08:38.872" v="0"/>
-          <pc:sldLayoutMkLst>
-            <pc:docMk/>
-            <pc:sldMasterMk cId="2460954070" sldId="2147483660"/>
-            <pc:sldLayoutMk cId="2591524520" sldId="2147483663"/>
-          </pc:sldLayoutMkLst>
-        </pc:sldLayoutChg>
-        <pc:sldLayoutChg chg="del">
-          <pc:chgData name="Luis guilherme De barros andrade faria" userId="S::luis.faria@student.torrens.edu.au::31e40991-e7d9-41d2-8af0-eeeeb0b0a000" providerId="AD" clId="Web-{10892CEB-547D-0641-B21D-9C6144283A02}" dt="2025-07-30T09:08:38.872" v="0"/>
-          <pc:sldLayoutMkLst>
-            <pc:docMk/>
-            <pc:sldMasterMk cId="2460954070" sldId="2147483660"/>
-            <pc:sldLayoutMk cId="1203092039" sldId="2147483664"/>
-          </pc:sldLayoutMkLst>
-        </pc:sldLayoutChg>
-        <pc:sldLayoutChg chg="del">
-          <pc:chgData name="Luis guilherme De barros andrade faria" userId="S::luis.faria@student.torrens.edu.au::31e40991-e7d9-41d2-8af0-eeeeb0b0a000" providerId="AD" clId="Web-{10892CEB-547D-0641-B21D-9C6144283A02}" dt="2025-07-30T09:08:38.872" v="0"/>
-          <pc:sldLayoutMkLst>
-            <pc:docMk/>
-            <pc:sldMasterMk cId="2460954070" sldId="2147483660"/>
-            <pc:sldLayoutMk cId="3733172339" sldId="2147483665"/>
-          </pc:sldLayoutMkLst>
-        </pc:sldLayoutChg>
-        <pc:sldLayoutChg chg="del">
-          <pc:chgData name="Luis guilherme De barros andrade faria" userId="S::luis.faria@student.torrens.edu.au::31e40991-e7d9-41d2-8af0-eeeeb0b0a000" providerId="AD" clId="Web-{10892CEB-547D-0641-B21D-9C6144283A02}" dt="2025-07-30T09:08:38.872" v="0"/>
-          <pc:sldLayoutMkLst>
-            <pc:docMk/>
-            <pc:sldMasterMk cId="2460954070" sldId="2147483660"/>
-            <pc:sldLayoutMk cId="3210312558" sldId="2147483666"/>
-          </pc:sldLayoutMkLst>
-        </pc:sldLayoutChg>
-        <pc:sldLayoutChg chg="del">
-          <pc:chgData name="Luis guilherme De barros andrade faria" userId="S::luis.faria@student.torrens.edu.au::31e40991-e7d9-41d2-8af0-eeeeb0b0a000" providerId="AD" clId="Web-{10892CEB-547D-0641-B21D-9C6144283A02}" dt="2025-07-30T09:08:38.872" v="0"/>
-          <pc:sldLayoutMkLst>
-            <pc:docMk/>
-            <pc:sldMasterMk cId="2460954070" sldId="2147483660"/>
-            <pc:sldLayoutMk cId="3146388984" sldId="2147483667"/>
-          </pc:sldLayoutMkLst>
-        </pc:sldLayoutChg>
-        <pc:sldLayoutChg chg="del">
-          <pc:chgData name="Luis guilherme De barros andrade faria" userId="S::luis.faria@student.torrens.edu.au::31e40991-e7d9-41d2-8af0-eeeeb0b0a000" providerId="AD" clId="Web-{10892CEB-547D-0641-B21D-9C6144283A02}" dt="2025-07-30T09:08:38.872" v="0"/>
-          <pc:sldLayoutMkLst>
-            <pc:docMk/>
-            <pc:sldMasterMk cId="2460954070" sldId="2147483660"/>
-            <pc:sldLayoutMk cId="3171841454" sldId="2147483668"/>
-          </pc:sldLayoutMkLst>
-        </pc:sldLayoutChg>
-        <pc:sldLayoutChg chg="del">
-          <pc:chgData name="Luis guilherme De barros andrade faria" userId="S::luis.faria@student.torrens.edu.au::31e40991-e7d9-41d2-8af0-eeeeb0b0a000" providerId="AD" clId="Web-{10892CEB-547D-0641-B21D-9C6144283A02}" dt="2025-07-30T09:08:38.872" v="0"/>
-          <pc:sldLayoutMkLst>
-            <pc:docMk/>
-            <pc:sldMasterMk cId="2460954070" sldId="2147483660"/>
-            <pc:sldLayoutMk cId="1718958274" sldId="2147483669"/>
-          </pc:sldLayoutMkLst>
-        </pc:sldLayoutChg>
-        <pc:sldLayoutChg chg="del">
-          <pc:chgData name="Luis guilherme De barros andrade faria" userId="S::luis.faria@student.torrens.edu.au::31e40991-e7d9-41d2-8af0-eeeeb0b0a000" providerId="AD" clId="Web-{10892CEB-547D-0641-B21D-9C6144283A02}" dt="2025-07-30T09:08:38.872" v="0"/>
-          <pc:sldLayoutMkLst>
-            <pc:docMk/>
-            <pc:sldMasterMk cId="2460954070" sldId="2147483660"/>
-            <pc:sldLayoutMk cId="2202905451" sldId="2147483670"/>
-          </pc:sldLayoutMkLst>
-        </pc:sldLayoutChg>
-        <pc:sldLayoutChg chg="del">
-          <pc:chgData name="Luis guilherme De barros andrade faria" userId="S::luis.faria@student.torrens.edu.au::31e40991-e7d9-41d2-8af0-eeeeb0b0a000" providerId="AD" clId="Web-{10892CEB-547D-0641-B21D-9C6144283A02}" dt="2025-07-30T09:08:38.872" v="0"/>
-          <pc:sldLayoutMkLst>
-            <pc:docMk/>
-            <pc:sldMasterMk cId="2460954070" sldId="2147483660"/>
-            <pc:sldLayoutMk cId="3479445657" sldId="2147483671"/>
-          </pc:sldLayoutMkLst>
-        </pc:sldLayoutChg>
-      </pc:sldMasterChg>
-      <pc:sldMasterChg chg="add addSldLayout">
-        <pc:chgData name="Luis guilherme De barros andrade faria" userId="S::luis.faria@student.torrens.edu.au::31e40991-e7d9-41d2-8af0-eeeeb0b0a000" providerId="AD" clId="Web-{10892CEB-547D-0641-B21D-9C6144283A02}" dt="2025-07-30T09:08:38.872" v="0"/>
-        <pc:sldMasterMkLst>
-          <pc:docMk/>
-          <pc:sldMasterMk cId="3785464112" sldId="2147483708"/>
-        </pc:sldMasterMkLst>
-        <pc:sldLayoutChg chg="add">
-          <pc:chgData name="Luis guilherme De barros andrade faria" userId="S::luis.faria@student.torrens.edu.au::31e40991-e7d9-41d2-8af0-eeeeb0b0a000" providerId="AD" clId="Web-{10892CEB-547D-0641-B21D-9C6144283A02}" dt="2025-07-30T09:08:38.872" v="0"/>
-          <pc:sldLayoutMkLst>
-            <pc:docMk/>
-            <pc:sldMasterMk cId="3785464112" sldId="2147483708"/>
-            <pc:sldLayoutMk cId="671096204" sldId="2147483697"/>
-          </pc:sldLayoutMkLst>
-        </pc:sldLayoutChg>
-        <pc:sldLayoutChg chg="add">
-          <pc:chgData name="Luis guilherme De barros andrade faria" userId="S::luis.faria@student.torrens.edu.au::31e40991-e7d9-41d2-8af0-eeeeb0b0a000" providerId="AD" clId="Web-{10892CEB-547D-0641-B21D-9C6144283A02}" dt="2025-07-30T09:08:38.872" v="0"/>
-          <pc:sldLayoutMkLst>
-            <pc:docMk/>
-            <pc:sldMasterMk cId="3785464112" sldId="2147483708"/>
-            <pc:sldLayoutMk cId="1488169071" sldId="2147483698"/>
-          </pc:sldLayoutMkLst>
-        </pc:sldLayoutChg>
-        <pc:sldLayoutChg chg="add">
-          <pc:chgData name="Luis guilherme De barros andrade faria" userId="S::luis.faria@student.torrens.edu.au::31e40991-e7d9-41d2-8af0-eeeeb0b0a000" providerId="AD" clId="Web-{10892CEB-547D-0641-B21D-9C6144283A02}" dt="2025-07-30T09:08:38.872" v="0"/>
-          <pc:sldLayoutMkLst>
-            <pc:docMk/>
-            <pc:sldMasterMk cId="3785464112" sldId="2147483708"/>
-            <pc:sldLayoutMk cId="2959263956" sldId="2147483699"/>
-          </pc:sldLayoutMkLst>
-        </pc:sldLayoutChg>
-        <pc:sldLayoutChg chg="add">
-          <pc:chgData name="Luis guilherme De barros andrade faria" userId="S::luis.faria@student.torrens.edu.au::31e40991-e7d9-41d2-8af0-eeeeb0b0a000" providerId="AD" clId="Web-{10892CEB-547D-0641-B21D-9C6144283A02}" dt="2025-07-30T09:08:38.872" v="0"/>
-          <pc:sldLayoutMkLst>
-            <pc:docMk/>
-            <pc:sldMasterMk cId="3785464112" sldId="2147483708"/>
-            <pc:sldLayoutMk cId="286119495" sldId="2147483700"/>
-          </pc:sldLayoutMkLst>
-        </pc:sldLayoutChg>
-        <pc:sldLayoutChg chg="add">
-          <pc:chgData name="Luis guilherme De barros andrade faria" userId="S::luis.faria@student.torrens.edu.au::31e40991-e7d9-41d2-8af0-eeeeb0b0a000" providerId="AD" clId="Web-{10892CEB-547D-0641-B21D-9C6144283A02}" dt="2025-07-30T09:08:38.872" v="0"/>
-          <pc:sldLayoutMkLst>
-            <pc:docMk/>
-            <pc:sldMasterMk cId="3785464112" sldId="2147483708"/>
-            <pc:sldLayoutMk cId="2068396335" sldId="2147483701"/>
-          </pc:sldLayoutMkLst>
-        </pc:sldLayoutChg>
-        <pc:sldLayoutChg chg="add">
-          <pc:chgData name="Luis guilherme De barros andrade faria" userId="S::luis.faria@student.torrens.edu.au::31e40991-e7d9-41d2-8af0-eeeeb0b0a000" providerId="AD" clId="Web-{10892CEB-547D-0641-B21D-9C6144283A02}" dt="2025-07-30T09:08:38.872" v="0"/>
-          <pc:sldLayoutMkLst>
-            <pc:docMk/>
-            <pc:sldMasterMk cId="3785464112" sldId="2147483708"/>
-            <pc:sldLayoutMk cId="2295781392" sldId="2147483702"/>
-          </pc:sldLayoutMkLst>
-        </pc:sldLayoutChg>
-        <pc:sldLayoutChg chg="add">
-          <pc:chgData name="Luis guilherme De barros andrade faria" userId="S::luis.faria@student.torrens.edu.au::31e40991-e7d9-41d2-8af0-eeeeb0b0a000" providerId="AD" clId="Web-{10892CEB-547D-0641-B21D-9C6144283A02}" dt="2025-07-30T09:08:38.872" v="0"/>
-          <pc:sldLayoutMkLst>
-            <pc:docMk/>
-            <pc:sldMasterMk cId="3785464112" sldId="2147483708"/>
-            <pc:sldLayoutMk cId="3519574986" sldId="2147483703"/>
-          </pc:sldLayoutMkLst>
-        </pc:sldLayoutChg>
-        <pc:sldLayoutChg chg="add">
-          <pc:chgData name="Luis guilherme De barros andrade faria" userId="S::luis.faria@student.torrens.edu.au::31e40991-e7d9-41d2-8af0-eeeeb0b0a000" providerId="AD" clId="Web-{10892CEB-547D-0641-B21D-9C6144283A02}" dt="2025-07-30T09:08:38.872" v="0"/>
-          <pc:sldLayoutMkLst>
-            <pc:docMk/>
-            <pc:sldMasterMk cId="3785464112" sldId="2147483708"/>
-            <pc:sldLayoutMk cId="3814265965" sldId="2147483704"/>
-          </pc:sldLayoutMkLst>
-        </pc:sldLayoutChg>
-        <pc:sldLayoutChg chg="add">
-          <pc:chgData name="Luis guilherme De barros andrade faria" userId="S::luis.faria@student.torrens.edu.au::31e40991-e7d9-41d2-8af0-eeeeb0b0a000" providerId="AD" clId="Web-{10892CEB-547D-0641-B21D-9C6144283A02}" dt="2025-07-30T09:08:38.872" v="0"/>
-          <pc:sldLayoutMkLst>
-            <pc:docMk/>
-            <pc:sldMasterMk cId="3785464112" sldId="2147483708"/>
-            <pc:sldLayoutMk cId="1332372080" sldId="2147483705"/>
-          </pc:sldLayoutMkLst>
-        </pc:sldLayoutChg>
-        <pc:sldLayoutChg chg="add">
-          <pc:chgData name="Luis guilherme De barros andrade faria" userId="S::luis.faria@student.torrens.edu.au::31e40991-e7d9-41d2-8af0-eeeeb0b0a000" providerId="AD" clId="Web-{10892CEB-547D-0641-B21D-9C6144283A02}" dt="2025-07-30T09:08:38.872" v="0"/>
-          <pc:sldLayoutMkLst>
-            <pc:docMk/>
-            <pc:sldMasterMk cId="3785464112" sldId="2147483708"/>
-            <pc:sldLayoutMk cId="3461795521" sldId="2147483706"/>
-          </pc:sldLayoutMkLst>
-        </pc:sldLayoutChg>
-        <pc:sldLayoutChg chg="add">
-          <pc:chgData name="Luis guilherme De barros andrade faria" userId="S::luis.faria@student.torrens.edu.au::31e40991-e7d9-41d2-8af0-eeeeb0b0a000" providerId="AD" clId="Web-{10892CEB-547D-0641-B21D-9C6144283A02}" dt="2025-07-30T09:08:38.872" v="0"/>
-          <pc:sldLayoutMkLst>
-            <pc:docMk/>
-            <pc:sldMasterMk cId="3785464112" sldId="2147483708"/>
-            <pc:sldLayoutMk cId="4154854662" sldId="2147483707"/>
-          </pc:sldLayoutMkLst>
-        </pc:sldLayoutChg>
-      </pc:sldMasterChg>
-    </pc:docChg>
-  </pc:docChgLst>
-  <pc:docChgLst>
-    <pc:chgData name="Luis guilherme De barros andrade faria" userId="S::luis.faria@student.torrens.edu.au::31e40991-e7d9-41d2-8af0-eeeeb0b0a000" providerId="AD" clId="Web-{1AC19570-BA81-7B76-472C-FE5D0D97EFFF}"/>
-    <pc:docChg chg="modSld">
-      <pc:chgData name="Luis guilherme De barros andrade faria" userId="S::luis.faria@student.torrens.edu.au::31e40991-e7d9-41d2-8af0-eeeeb0b0a000" providerId="AD" clId="Web-{1AC19570-BA81-7B76-472C-FE5D0D97EFFF}" dt="2025-07-30T09:24:58.804" v="32"/>
-      <pc:docMkLst>
-        <pc:docMk/>
-      </pc:docMkLst>
-      <pc:sldChg chg="addSp delSp modSp mod setClrOvrMap">
-        <pc:chgData name="Luis guilherme De barros andrade faria" userId="S::luis.faria@student.torrens.edu.au::31e40991-e7d9-41d2-8af0-eeeeb0b0a000" providerId="AD" clId="Web-{1AC19570-BA81-7B76-472C-FE5D0D97EFFF}" dt="2025-07-30T09:24:58.804" v="32"/>
-        <pc:sldMkLst>
-          <pc:docMk/>
-          <pc:sldMk cId="109857222" sldId="256"/>
-        </pc:sldMkLst>
-        <pc:spChg chg="mod">
-          <ac:chgData name="Luis guilherme De barros andrade faria" userId="S::luis.faria@student.torrens.edu.au::31e40991-e7d9-41d2-8af0-eeeeb0b0a000" providerId="AD" clId="Web-{1AC19570-BA81-7B76-472C-FE5D0D97EFFF}" dt="2025-07-30T09:24:58.804" v="32"/>
-          <ac:spMkLst>
-            <pc:docMk/>
-            <pc:sldMk cId="109857222" sldId="256"/>
-            <ac:spMk id="2" creationId="{00000000-0000-0000-0000-000000000000}"/>
-          </ac:spMkLst>
-        </pc:spChg>
-        <pc:spChg chg="mod">
-          <ac:chgData name="Luis guilherme De barros andrade faria" userId="S::luis.faria@student.torrens.edu.au::31e40991-e7d9-41d2-8af0-eeeeb0b0a000" providerId="AD" clId="Web-{1AC19570-BA81-7B76-472C-FE5D0D97EFFF}" dt="2025-07-30T09:23:12.538" v="11"/>
-          <ac:spMkLst>
-            <pc:docMk/>
-            <pc:sldMk cId="109857222" sldId="256"/>
-            <ac:spMk id="3" creationId="{00000000-0000-0000-0000-000000000000}"/>
-          </ac:spMkLst>
-        </pc:spChg>
-      </pc:sldChg>
-    </pc:docChg>
-  </pc:docChgLst>
-  <pc:docChgLst>
-    <pc:chgData name="Luis guilherme De barros andrade faria" userId="S::luis.faria@student.torrens.edu.au::31e40991-e7d9-41d2-8af0-eeeeb0b0a000" providerId="AD" clId="Web-{4533454B-DE62-CA03-1178-6FC5C950F6A0}"/>
-    <pc:docChg chg="addSld delSld modSld">
-      <pc:chgData name="Luis guilherme De barros andrade faria" userId="S::luis.faria@student.torrens.edu.au::31e40991-e7d9-41d2-8af0-eeeeb0b0a000" providerId="AD" clId="Web-{4533454B-DE62-CA03-1178-6FC5C950F6A0}" dt="2025-08-02T08:19:53.172" v="203"/>
-      <pc:docMkLst>
-        <pc:docMk/>
-      </pc:docMkLst>
-      <pc:sldChg chg="addSp delSp modSp mod setClrOvrMap">
-        <pc:chgData name="Luis guilherme De barros andrade faria" userId="S::luis.faria@student.torrens.edu.au::31e40991-e7d9-41d2-8af0-eeeeb0b0a000" providerId="AD" clId="Web-{4533454B-DE62-CA03-1178-6FC5C950F6A0}" dt="2025-08-02T08:18:42.354" v="186"/>
-        <pc:sldMkLst>
-          <pc:docMk/>
-          <pc:sldMk cId="109857222" sldId="256"/>
-        </pc:sldMkLst>
-        <pc:spChg chg="mod">
-          <ac:chgData name="Luis guilherme De barros andrade faria" userId="S::luis.faria@student.torrens.edu.au::31e40991-e7d9-41d2-8af0-eeeeb0b0a000" providerId="AD" clId="Web-{4533454B-DE62-CA03-1178-6FC5C950F6A0}" dt="2025-08-02T08:17:39.649" v="171" actId="20577"/>
-          <ac:spMkLst>
-            <pc:docMk/>
-            <pc:sldMk cId="109857222" sldId="256"/>
-            <ac:spMk id="2" creationId="{00000000-0000-0000-0000-000000000000}"/>
-          </ac:spMkLst>
-        </pc:spChg>
-        <pc:spChg chg="mod">
-          <ac:chgData name="Luis guilherme De barros andrade faria" userId="S::luis.faria@student.torrens.edu.au::31e40991-e7d9-41d2-8af0-eeeeb0b0a000" providerId="AD" clId="Web-{4533454B-DE62-CA03-1178-6FC5C950F6A0}" dt="2025-08-02T08:17:15.492" v="163" actId="20577"/>
-          <ac:spMkLst>
-            <pc:docMk/>
-            <pc:sldMk cId="109857222" sldId="256"/>
-            <ac:spMk id="3" creationId="{00000000-0000-0000-0000-000000000000}"/>
-          </ac:spMkLst>
-        </pc:spChg>
-        <pc:spChg chg="add">
-          <ac:chgData name="Luis guilherme De barros andrade faria" userId="S::luis.faria@student.torrens.edu.au::31e40991-e7d9-41d2-8af0-eeeeb0b0a000" providerId="AD" clId="Web-{4533454B-DE62-CA03-1178-6FC5C950F6A0}" dt="2025-08-02T08:15:16.665" v="123"/>
-          <ac:spMkLst>
-            <pc:docMk/>
-            <pc:sldMk cId="109857222" sldId="256"/>
-            <ac:spMk id="1052" creationId="{D2E2F6D9-F9F0-47A2-A074-0A6B79B64775}"/>
-          </ac:spMkLst>
-        </pc:spChg>
-        <pc:spChg chg="add">
-          <ac:chgData name="Luis guilherme De barros andrade faria" userId="S::luis.faria@student.torrens.edu.au::31e40991-e7d9-41d2-8af0-eeeeb0b0a000" providerId="AD" clId="Web-{4533454B-DE62-CA03-1178-6FC5C950F6A0}" dt="2025-08-02T08:15:16.665" v="123"/>
-          <ac:spMkLst>
-            <pc:docMk/>
-            <pc:sldMk cId="109857222" sldId="256"/>
-            <ac:spMk id="1054" creationId="{265DF4B1-F551-4918-A8AC-57E79CC4F010}"/>
-          </ac:spMkLst>
-        </pc:spChg>
-        <pc:picChg chg="add mod">
-          <ac:chgData name="Luis guilherme De barros andrade faria" userId="S::luis.faria@student.torrens.edu.au::31e40991-e7d9-41d2-8af0-eeeeb0b0a000" providerId="AD" clId="Web-{4533454B-DE62-CA03-1178-6FC5C950F6A0}" dt="2025-08-02T08:15:16.665" v="123"/>
-          <ac:picMkLst>
-            <pc:docMk/>
-            <pc:sldMk cId="109857222" sldId="256"/>
-            <ac:picMk id="4" creationId="{E6E36DD9-A227-ECDC-E54F-201590B94C2F}"/>
-          </ac:picMkLst>
-        </pc:picChg>
-        <pc:picChg chg="add mod">
-          <ac:chgData name="Luis guilherme De barros andrade faria" userId="S::luis.faria@student.torrens.edu.au::31e40991-e7d9-41d2-8af0-eeeeb0b0a000" providerId="AD" clId="Web-{4533454B-DE62-CA03-1178-6FC5C950F6A0}" dt="2025-08-02T08:18:37.526" v="185" actId="1076"/>
-          <ac:picMkLst>
-            <pc:docMk/>
-            <pc:sldMk cId="109857222" sldId="256"/>
-            <ac:picMk id="6" creationId="{570C4B40-A618-2611-2876-271C25752E3F}"/>
-          </ac:picMkLst>
-        </pc:picChg>
-        <pc:picChg chg="mod ord">
-          <ac:chgData name="Luis guilherme De barros andrade faria" userId="S::luis.faria@student.torrens.edu.au::31e40991-e7d9-41d2-8af0-eeeeb0b0a000" providerId="AD" clId="Web-{4533454B-DE62-CA03-1178-6FC5C950F6A0}" dt="2025-08-02T08:15:16.665" v="123"/>
-          <ac:picMkLst>
-            <pc:docMk/>
-            <pc:sldMk cId="109857222" sldId="256"/>
-            <ac:picMk id="1026" creationId="{69417FC9-1C49-F25C-233D-4A85ACC83FD5}"/>
-          </ac:picMkLst>
-        </pc:picChg>
-        <pc:cxnChg chg="add">
-          <ac:chgData name="Luis guilherme De barros andrade faria" userId="S::luis.faria@student.torrens.edu.au::31e40991-e7d9-41d2-8af0-eeeeb0b0a000" providerId="AD" clId="Web-{4533454B-DE62-CA03-1178-6FC5C950F6A0}" dt="2025-08-02T08:15:16.665" v="123"/>
-          <ac:cxnSpMkLst>
-            <pc:docMk/>
-            <pc:sldMk cId="109857222" sldId="256"/>
-            <ac:cxnSpMk id="1056" creationId="{20EEADAF-D8D3-450B-A46D-DE8E54173E02}"/>
-          </ac:cxnSpMkLst>
-        </pc:cxnChg>
-      </pc:sldChg>
-      <pc:sldChg chg="addSp delSp modSp mod setBg">
-        <pc:chgData name="Luis guilherme De barros andrade faria" userId="S::luis.faria@student.torrens.edu.au::31e40991-e7d9-41d2-8af0-eeeeb0b0a000" providerId="AD" clId="Web-{4533454B-DE62-CA03-1178-6FC5C950F6A0}" dt="2025-08-02T08:19:31.687" v="189" actId="1076"/>
-        <pc:sldMkLst>
-          <pc:docMk/>
-          <pc:sldMk cId="289368279" sldId="257"/>
-        </pc:sldMkLst>
-        <pc:spChg chg="mod">
-          <ac:chgData name="Luis guilherme De barros andrade faria" userId="S::luis.faria@student.torrens.edu.au::31e40991-e7d9-41d2-8af0-eeeeb0b0a000" providerId="AD" clId="Web-{4533454B-DE62-CA03-1178-6FC5C950F6A0}" dt="2025-08-02T07:56:14.714" v="3"/>
-          <ac:spMkLst>
-            <pc:docMk/>
-            <pc:sldMk cId="289368279" sldId="257"/>
-            <ac:spMk id="2" creationId="{33AA03FC-5505-7C29-91D2-1738A46F72D2}"/>
-          </ac:spMkLst>
-        </pc:spChg>
-        <pc:spChg chg="mod ord">
-          <ac:chgData name="Luis guilherme De barros andrade faria" userId="S::luis.faria@student.torrens.edu.au::31e40991-e7d9-41d2-8af0-eeeeb0b0a000" providerId="AD" clId="Web-{4533454B-DE62-CA03-1178-6FC5C950F6A0}" dt="2025-08-02T07:56:14.714" v="3"/>
-          <ac:spMkLst>
-            <pc:docMk/>
-            <pc:sldMk cId="289368279" sldId="257"/>
-            <ac:spMk id="3" creationId="{A4AFB0F5-03C3-BE28-1ADB-7363705150CD}"/>
-          </ac:spMkLst>
-        </pc:spChg>
-        <pc:spChg chg="add">
-          <ac:chgData name="Luis guilherme De barros andrade faria" userId="S::luis.faria@student.torrens.edu.au::31e40991-e7d9-41d2-8af0-eeeeb0b0a000" providerId="AD" clId="Web-{4533454B-DE62-CA03-1178-6FC5C950F6A0}" dt="2025-08-02T07:56:14.714" v="3"/>
-          <ac:spMkLst>
-            <pc:docMk/>
-            <pc:sldMk cId="289368279" sldId="257"/>
-            <ac:spMk id="9" creationId="{E49D7415-2F11-44C2-B6AA-13A25B6814B9}"/>
-          </ac:spMkLst>
-        </pc:spChg>
-        <pc:picChg chg="add mod">
-          <ac:chgData name="Luis guilherme De barros andrade faria" userId="S::luis.faria@student.torrens.edu.au::31e40991-e7d9-41d2-8af0-eeeeb0b0a000" providerId="AD" clId="Web-{4533454B-DE62-CA03-1178-6FC5C950F6A0}" dt="2025-08-02T07:56:14.714" v="3"/>
-          <ac:picMkLst>
-            <pc:docMk/>
-            <pc:sldMk cId="289368279" sldId="257"/>
-            <ac:picMk id="4" creationId="{24848625-DE84-C1BD-DC37-9155E7413A79}"/>
-          </ac:picMkLst>
-        </pc:picChg>
-        <pc:picChg chg="add mod">
-          <ac:chgData name="Luis guilherme De barros andrade faria" userId="S::luis.faria@student.torrens.edu.au::31e40991-e7d9-41d2-8af0-eeeeb0b0a000" providerId="AD" clId="Web-{4533454B-DE62-CA03-1178-6FC5C950F6A0}" dt="2025-08-02T08:19:31.687" v="189" actId="1076"/>
-          <ac:picMkLst>
-            <pc:docMk/>
-            <pc:sldMk cId="289368279" sldId="257"/>
-            <ac:picMk id="10" creationId="{284AD4D5-C6C9-6C7F-CD00-4600BE87A552}"/>
-          </ac:picMkLst>
-        </pc:picChg>
-        <pc:cxnChg chg="add">
-          <ac:chgData name="Luis guilherme De barros andrade faria" userId="S::luis.faria@student.torrens.edu.au::31e40991-e7d9-41d2-8af0-eeeeb0b0a000" providerId="AD" clId="Web-{4533454B-DE62-CA03-1178-6FC5C950F6A0}" dt="2025-08-02T07:56:14.714" v="3"/>
-          <ac:cxnSpMkLst>
-            <pc:docMk/>
-            <pc:sldMk cId="289368279" sldId="257"/>
-            <ac:cxnSpMk id="11" creationId="{D2E57F3D-33BE-4306-87E6-245763719516}"/>
-          </ac:cxnSpMkLst>
-        </pc:cxnChg>
-      </pc:sldChg>
-      <pc:sldChg chg="addSp delSp modSp">
-        <pc:chgData name="Luis guilherme De barros andrade faria" userId="S::luis.faria@student.torrens.edu.au::31e40991-e7d9-41d2-8af0-eeeeb0b0a000" providerId="AD" clId="Web-{4533454B-DE62-CA03-1178-6FC5C950F6A0}" dt="2025-08-02T08:19:35.953" v="191"/>
-        <pc:sldMkLst>
-          <pc:docMk/>
-          <pc:sldMk cId="1725121888" sldId="258"/>
-        </pc:sldMkLst>
-        <pc:spChg chg="mod">
-          <ac:chgData name="Luis guilherme De barros andrade faria" userId="S::luis.faria@student.torrens.edu.au::31e40991-e7d9-41d2-8af0-eeeeb0b0a000" providerId="AD" clId="Web-{4533454B-DE62-CA03-1178-6FC5C950F6A0}" dt="2025-08-02T07:56:36.528" v="5" actId="20577"/>
-          <ac:spMkLst>
-            <pc:docMk/>
-            <pc:sldMk cId="1725121888" sldId="258"/>
-            <ac:spMk id="3" creationId="{97DC1AB1-7DF5-8EF4-396D-AA56EEF2D41D}"/>
-          </ac:spMkLst>
-        </pc:spChg>
-        <pc:picChg chg="add">
-          <ac:chgData name="Luis guilherme De barros andrade faria" userId="S::luis.faria@student.torrens.edu.au::31e40991-e7d9-41d2-8af0-eeeeb0b0a000" providerId="AD" clId="Web-{4533454B-DE62-CA03-1178-6FC5C950F6A0}" dt="2025-08-02T08:19:35.953" v="191"/>
-          <ac:picMkLst>
-            <pc:docMk/>
-            <pc:sldMk cId="1725121888" sldId="258"/>
-            <ac:picMk id="8" creationId="{300295DF-D725-EF77-D701-5D9BD76BAE61}"/>
-          </ac:picMkLst>
-        </pc:picChg>
-      </pc:sldChg>
-      <pc:sldChg chg="addSp delSp modSp">
-        <pc:chgData name="Luis guilherme De barros andrade faria" userId="S::luis.faria@student.torrens.edu.au::31e40991-e7d9-41d2-8af0-eeeeb0b0a000" providerId="AD" clId="Web-{4533454B-DE62-CA03-1178-6FC5C950F6A0}" dt="2025-08-02T08:19:38.875" v="193"/>
-        <pc:sldMkLst>
-          <pc:docMk/>
-          <pc:sldMk cId="2969302973" sldId="259"/>
-        </pc:sldMkLst>
-        <pc:spChg chg="mod">
-          <ac:chgData name="Luis guilherme De barros andrade faria" userId="S::luis.faria@student.torrens.edu.au::31e40991-e7d9-41d2-8af0-eeeeb0b0a000" providerId="AD" clId="Web-{4533454B-DE62-CA03-1178-6FC5C950F6A0}" dt="2025-08-02T07:56:46.138" v="6" actId="20577"/>
-          <ac:spMkLst>
-            <pc:docMk/>
-            <pc:sldMk cId="2969302973" sldId="259"/>
-            <ac:spMk id="3" creationId="{128842BA-4FD2-5DE1-4327-85AE2A9AC27A}"/>
-          </ac:spMkLst>
-        </pc:spChg>
-        <pc:picChg chg="add">
-          <ac:chgData name="Luis guilherme De barros andrade faria" userId="S::luis.faria@student.torrens.edu.au::31e40991-e7d9-41d2-8af0-eeeeb0b0a000" providerId="AD" clId="Web-{4533454B-DE62-CA03-1178-6FC5C950F6A0}" dt="2025-08-02T08:19:38.875" v="193"/>
-          <ac:picMkLst>
-            <pc:docMk/>
-            <pc:sldMk cId="2969302973" sldId="259"/>
-            <ac:picMk id="8" creationId="{C02D0FAA-E62A-A0AF-B795-DD512745A32A}"/>
-          </ac:picMkLst>
-        </pc:picChg>
-      </pc:sldChg>
-      <pc:sldChg chg="addSp delSp modSp">
-        <pc:chgData name="Luis guilherme De barros andrade faria" userId="S::luis.faria@student.torrens.edu.au::31e40991-e7d9-41d2-8af0-eeeeb0b0a000" providerId="AD" clId="Web-{4533454B-DE62-CA03-1178-6FC5C950F6A0}" dt="2025-08-02T08:19:41.734" v="195"/>
-        <pc:sldMkLst>
-          <pc:docMk/>
-          <pc:sldMk cId="156018877" sldId="260"/>
-        </pc:sldMkLst>
-        <pc:spChg chg="mod">
-          <ac:chgData name="Luis guilherme De barros andrade faria" userId="S::luis.faria@student.torrens.edu.au::31e40991-e7d9-41d2-8af0-eeeeb0b0a000" providerId="AD" clId="Web-{4533454B-DE62-CA03-1178-6FC5C950F6A0}" dt="2025-08-02T07:56:57.217" v="8" actId="20577"/>
-          <ac:spMkLst>
-            <pc:docMk/>
-            <pc:sldMk cId="156018877" sldId="260"/>
-            <ac:spMk id="3" creationId="{8D37C389-CD99-F4C6-44EB-BAAD0A52FCBD}"/>
-          </ac:spMkLst>
-        </pc:spChg>
-        <pc:picChg chg="add">
-          <ac:chgData name="Luis guilherme De barros andrade faria" userId="S::luis.faria@student.torrens.edu.au::31e40991-e7d9-41d2-8af0-eeeeb0b0a000" providerId="AD" clId="Web-{4533454B-DE62-CA03-1178-6FC5C950F6A0}" dt="2025-08-02T08:19:41.734" v="195"/>
-          <ac:picMkLst>
-            <pc:docMk/>
-            <pc:sldMk cId="156018877" sldId="260"/>
-            <ac:picMk id="8" creationId="{97F57559-18B6-F9C8-018A-117DB982FBAB}"/>
-          </ac:picMkLst>
-        </pc:picChg>
-      </pc:sldChg>
-      <pc:sldChg chg="addSp delSp modSp">
-        <pc:chgData name="Luis guilherme De barros andrade faria" userId="S::luis.faria@student.torrens.edu.au::31e40991-e7d9-41d2-8af0-eeeeb0b0a000" providerId="AD" clId="Web-{4533454B-DE62-CA03-1178-6FC5C950F6A0}" dt="2025-08-02T08:19:44.656" v="197"/>
-        <pc:sldMkLst>
-          <pc:docMk/>
-          <pc:sldMk cId="1083875465" sldId="261"/>
-        </pc:sldMkLst>
-        <pc:spChg chg="mod">
-          <ac:chgData name="Luis guilherme De barros andrade faria" userId="S::luis.faria@student.torrens.edu.au::31e40991-e7d9-41d2-8af0-eeeeb0b0a000" providerId="AD" clId="Web-{4533454B-DE62-CA03-1178-6FC5C950F6A0}" dt="2025-08-02T07:59:51.213" v="48" actId="20577"/>
-          <ac:spMkLst>
-            <pc:docMk/>
-            <pc:sldMk cId="1083875465" sldId="261"/>
-            <ac:spMk id="3" creationId="{F50607A3-6501-9AFC-CA09-5BB6CC46E19B}"/>
-          </ac:spMkLst>
-        </pc:spChg>
-      </pc:sldChg>
-      <pc:sldChg chg="addSp delSp modSp">
-        <pc:chgData name="Luis guilherme De barros andrade faria" userId="S::luis.faria@student.torrens.edu.au::31e40991-e7d9-41d2-8af0-eeeeb0b0a000" providerId="AD" clId="Web-{4533454B-DE62-CA03-1178-6FC5C950F6A0}" dt="2025-08-02T08:19:48.531" v="199"/>
-        <pc:sldMkLst>
-          <pc:docMk/>
-          <pc:sldMk cId="2354179793" sldId="262"/>
-        </pc:sldMkLst>
-        <pc:picChg chg="add">
-          <ac:chgData name="Luis guilherme De barros andrade faria" userId="S::luis.faria@student.torrens.edu.au::31e40991-e7d9-41d2-8af0-eeeeb0b0a000" providerId="AD" clId="Web-{4533454B-DE62-CA03-1178-6FC5C950F6A0}" dt="2025-08-02T08:19:48.531" v="199"/>
-          <ac:picMkLst>
-            <pc:docMk/>
-            <pc:sldMk cId="2354179793" sldId="262"/>
-            <ac:picMk id="8" creationId="{BD5F244A-5913-1970-5501-623D24B5922F}"/>
-          </ac:picMkLst>
-        </pc:picChg>
-      </pc:sldChg>
-      <pc:sldChg chg="addSp delSp modSp">
-        <pc:chgData name="Luis guilherme De barros andrade faria" userId="S::luis.faria@student.torrens.edu.au::31e40991-e7d9-41d2-8af0-eeeeb0b0a000" providerId="AD" clId="Web-{4533454B-DE62-CA03-1178-6FC5C950F6A0}" dt="2025-08-02T08:19:50.906" v="201"/>
-        <pc:sldMkLst>
-          <pc:docMk/>
-          <pc:sldMk cId="2107877928" sldId="263"/>
-        </pc:sldMkLst>
-        <pc:spChg chg="mod">
-          <ac:chgData name="Luis guilherme De barros andrade faria" userId="S::luis.faria@student.torrens.edu.au::31e40991-e7d9-41d2-8af0-eeeeb0b0a000" providerId="AD" clId="Web-{4533454B-DE62-CA03-1178-6FC5C950F6A0}" dt="2025-08-02T07:57:26.969" v="15" actId="20577"/>
-          <ac:spMkLst>
-            <pc:docMk/>
-            <pc:sldMk cId="2107877928" sldId="263"/>
-            <ac:spMk id="3" creationId="{AFF252BB-3FA2-0F8C-5CDD-FFADE079B4AB}"/>
-          </ac:spMkLst>
-        </pc:spChg>
-      </pc:sldChg>
-      <pc:sldChg chg="modSp del">
-        <pc:chgData name="Luis guilherme De barros andrade faria" userId="S::luis.faria@student.torrens.edu.au::31e40991-e7d9-41d2-8af0-eeeeb0b0a000" providerId="AD" clId="Web-{4533454B-DE62-CA03-1178-6FC5C950F6A0}" dt="2025-08-02T08:02:37.596" v="71"/>
-        <pc:sldMkLst>
-          <pc:docMk/>
-          <pc:sldMk cId="341832275" sldId="264"/>
-        </pc:sldMkLst>
-      </pc:sldChg>
-      <pc:sldChg chg="addSp delSp modSp add replId">
-        <pc:chgData name="Luis guilherme De barros andrade faria" userId="S::luis.faria@student.torrens.edu.au::31e40991-e7d9-41d2-8af0-eeeeb0b0a000" providerId="AD" clId="Web-{4533454B-DE62-CA03-1178-6FC5C950F6A0}" dt="2025-08-02T08:19:53.172" v="203"/>
-        <pc:sldMkLst>
-          <pc:docMk/>
-          <pc:sldMk cId="2631834832" sldId="265"/>
-        </pc:sldMkLst>
-      </pc:sldChg>
-    </pc:docChg>
-  </pc:docChgLst>
-  <pc:docChgLst>
-    <pc:chgData name="Luis guilherme De barros andrade faria" userId="S::luis.faria@student.torrens.edu.au::31e40991-e7d9-41d2-8af0-eeeeb0b0a000" providerId="AD" clId="Web-{96370F3D-ADEF-F44F-82BE-C6CBE7F2CCDE}"/>
-    <pc:docChg chg="modSld">
-      <pc:chgData name="Luis guilherme De barros andrade faria" userId="S::luis.faria@student.torrens.edu.au::31e40991-e7d9-41d2-8af0-eeeeb0b0a000" providerId="AD" clId="Web-{96370F3D-ADEF-F44F-82BE-C6CBE7F2CCDE}" dt="2025-08-07T01:40:47.469" v="7" actId="20577"/>
-      <pc:docMkLst>
-        <pc:docMk/>
-      </pc:docMkLst>
-      <pc:sldChg chg="modSp">
-        <pc:chgData name="Luis guilherme De barros andrade faria" userId="S::luis.faria@student.torrens.edu.au::31e40991-e7d9-41d2-8af0-eeeeb0b0a000" providerId="AD" clId="Web-{96370F3D-ADEF-F44F-82BE-C6CBE7F2CCDE}" dt="2025-08-07T01:40:47.469" v="7" actId="20577"/>
-        <pc:sldMkLst>
-          <pc:docMk/>
-          <pc:sldMk cId="109857222" sldId="256"/>
-        </pc:sldMkLst>
-        <pc:spChg chg="mod">
-          <ac:chgData name="Luis guilherme De barros andrade faria" userId="S::luis.faria@student.torrens.edu.au::31e40991-e7d9-41d2-8af0-eeeeb0b0a000" providerId="AD" clId="Web-{96370F3D-ADEF-F44F-82BE-C6CBE7F2CCDE}" dt="2025-08-07T01:40:47.469" v="7" actId="20577"/>
-          <ac:spMkLst>
-            <pc:docMk/>
-            <pc:sldMk cId="109857222" sldId="256"/>
-            <ac:spMk id="2" creationId="{00000000-0000-0000-0000-000000000000}"/>
-          </ac:spMkLst>
-        </pc:spChg>
-      </pc:sldChg>
-    </pc:docChg>
-  </pc:docChgLst>
-  <pc:docChgLst>
-    <pc:chgData name="Luis guilherme De barros andrade faria" userId="31e40991-e7d9-41d2-8af0-eeeeb0b0a000" providerId="ADAL" clId="{B6554E97-654E-F047-A081-3F6DD18F8C3B}"/>
-    <pc:docChg chg="undo redo custSel addSld delSld modSld sldOrd">
-      <pc:chgData name="Luis guilherme De barros andrade faria" userId="31e40991-e7d9-41d2-8af0-eeeeb0b0a000" providerId="ADAL" clId="{B6554E97-654E-F047-A081-3F6DD18F8C3B}" dt="2025-08-13T09:30:45.012" v="4045" actId="1076"/>
-      <pc:docMkLst>
-        <pc:docMk/>
-      </pc:docMkLst>
-      <pc:sldChg chg="modSp mod">
-        <pc:chgData name="Luis guilherme De barros andrade faria" userId="31e40991-e7d9-41d2-8af0-eeeeb0b0a000" providerId="ADAL" clId="{B6554E97-654E-F047-A081-3F6DD18F8C3B}" dt="2025-08-10T09:47:56.864" v="2" actId="14100"/>
-        <pc:sldMkLst>
-          <pc:docMk/>
-          <pc:sldMk cId="289368279" sldId="257"/>
-        </pc:sldMkLst>
-        <pc:spChg chg="mod">
-          <ac:chgData name="Luis guilherme De barros andrade faria" userId="31e40991-e7d9-41d2-8af0-eeeeb0b0a000" providerId="ADAL" clId="{B6554E97-654E-F047-A081-3F6DD18F8C3B}" dt="2025-08-10T09:47:56.864" v="2" actId="14100"/>
-          <ac:spMkLst>
-            <pc:docMk/>
-            <pc:sldMk cId="289368279" sldId="257"/>
-            <ac:spMk id="3" creationId="{A4AFB0F5-03C3-BE28-1ADB-7363705150CD}"/>
-          </ac:spMkLst>
-        </pc:spChg>
-      </pc:sldChg>
-      <pc:sldChg chg="addSp delSp modSp mod">
-        <pc:chgData name="Luis guilherme De barros andrade faria" userId="31e40991-e7d9-41d2-8af0-eeeeb0b0a000" providerId="ADAL" clId="{B6554E97-654E-F047-A081-3F6DD18F8C3B}" dt="2025-08-13T09:30:45.012" v="4045" actId="1076"/>
-        <pc:sldMkLst>
-          <pc:docMk/>
-          <pc:sldMk cId="2969302973" sldId="259"/>
-        </pc:sldMkLst>
-        <pc:spChg chg="mod">
-          <ac:chgData name="Luis guilherme De barros andrade faria" userId="31e40991-e7d9-41d2-8af0-eeeeb0b0a000" providerId="ADAL" clId="{B6554E97-654E-F047-A081-3F6DD18F8C3B}" dt="2025-08-13T09:30:37.703" v="4020" actId="1076"/>
-          <ac:spMkLst>
-            <pc:docMk/>
-            <pc:sldMk cId="2969302973" sldId="259"/>
-            <ac:spMk id="2" creationId="{880AAC80-1A7F-39FF-058B-780D98CC22AF}"/>
-          </ac:spMkLst>
-        </pc:spChg>
-        <pc:spChg chg="mod">
-          <ac:chgData name="Luis guilherme De barros andrade faria" userId="31e40991-e7d9-41d2-8af0-eeeeb0b0a000" providerId="ADAL" clId="{B6554E97-654E-F047-A081-3F6DD18F8C3B}" dt="2025-08-13T09:30:45.012" v="4045" actId="1076"/>
-          <ac:spMkLst>
-            <pc:docMk/>
-            <pc:sldMk cId="2969302973" sldId="259"/>
-            <ac:spMk id="3" creationId="{128842BA-4FD2-5DE1-4327-85AE2A9AC27A}"/>
-          </ac:spMkLst>
-        </pc:spChg>
-        <pc:spChg chg="add mod">
-          <ac:chgData name="Luis guilherme De barros andrade faria" userId="31e40991-e7d9-41d2-8af0-eeeeb0b0a000" providerId="ADAL" clId="{B6554E97-654E-F047-A081-3F6DD18F8C3B}" dt="2025-08-13T09:17:13.930" v="3121"/>
-          <ac:spMkLst>
-            <pc:docMk/>
-            <pc:sldMk cId="2969302973" sldId="259"/>
-            <ac:spMk id="10" creationId="{673AD66F-3C5A-5483-3C87-8A91EC673DFC}"/>
-          </ac:spMkLst>
-        </pc:spChg>
-        <pc:spChg chg="add mod">
-          <ac:chgData name="Luis guilherme De barros andrade faria" userId="31e40991-e7d9-41d2-8af0-eeeeb0b0a000" providerId="ADAL" clId="{B6554E97-654E-F047-A081-3F6DD18F8C3B}" dt="2025-08-13T09:17:13.930" v="3121"/>
-          <ac:spMkLst>
-            <pc:docMk/>
-            <pc:sldMk cId="2969302973" sldId="259"/>
-            <ac:spMk id="11" creationId="{A9D88244-E783-B3BE-F6F3-C7C3A0AD52A9}"/>
-          </ac:spMkLst>
-        </pc:spChg>
-        <pc:spChg chg="add mod">
-          <ac:chgData name="Luis guilherme De barros andrade faria" userId="31e40991-e7d9-41d2-8af0-eeeeb0b0a000" providerId="ADAL" clId="{B6554E97-654E-F047-A081-3F6DD18F8C3B}" dt="2025-08-13T09:17:13.930" v="3121"/>
-          <ac:spMkLst>
-            <pc:docMk/>
-            <pc:sldMk cId="2969302973" sldId="259"/>
-            <ac:spMk id="12" creationId="{E3D0E792-EBAD-0DCB-9ACA-6BFC51B0143F}"/>
-          </ac:spMkLst>
-        </pc:spChg>
-        <pc:spChg chg="add mod">
-          <ac:chgData name="Luis guilherme De barros andrade faria" userId="31e40991-e7d9-41d2-8af0-eeeeb0b0a000" providerId="ADAL" clId="{B6554E97-654E-F047-A081-3F6DD18F8C3B}" dt="2025-08-13T09:17:13.930" v="3121"/>
-          <ac:spMkLst>
-            <pc:docMk/>
-            <pc:sldMk cId="2969302973" sldId="259"/>
-            <ac:spMk id="13" creationId="{9793EB2C-6E6D-CA34-53BC-FC4B750BB0D3}"/>
-          </ac:spMkLst>
-        </pc:spChg>
-        <pc:spChg chg="add mod">
-          <ac:chgData name="Luis guilherme De barros andrade faria" userId="31e40991-e7d9-41d2-8af0-eeeeb0b0a000" providerId="ADAL" clId="{B6554E97-654E-F047-A081-3F6DD18F8C3B}" dt="2025-08-13T09:17:13.930" v="3121"/>
-          <ac:spMkLst>
-            <pc:docMk/>
-            <pc:sldMk cId="2969302973" sldId="259"/>
-            <ac:spMk id="14" creationId="{A592C623-934D-09AD-45A0-A8A96F278F80}"/>
-          </ac:spMkLst>
-        </pc:spChg>
-        <pc:spChg chg="add mod">
-          <ac:chgData name="Luis guilherme De barros andrade faria" userId="31e40991-e7d9-41d2-8af0-eeeeb0b0a000" providerId="ADAL" clId="{B6554E97-654E-F047-A081-3F6DD18F8C3B}" dt="2025-08-13T09:17:13.930" v="3121"/>
-          <ac:spMkLst>
-            <pc:docMk/>
-            <pc:sldMk cId="2969302973" sldId="259"/>
-            <ac:spMk id="15" creationId="{B46FBF7D-9068-056F-A2DC-B7794F07D6A5}"/>
-          </ac:spMkLst>
-        </pc:spChg>
-        <pc:spChg chg="add mod">
-          <ac:chgData name="Luis guilherme De barros andrade faria" userId="31e40991-e7d9-41d2-8af0-eeeeb0b0a000" providerId="ADAL" clId="{B6554E97-654E-F047-A081-3F6DD18F8C3B}" dt="2025-08-13T09:30:43.047" v="4044" actId="1036"/>
-          <ac:spMkLst>
-            <pc:docMk/>
-            <pc:sldMk cId="2969302973" sldId="259"/>
-            <ac:spMk id="16" creationId="{D6077E34-B06E-AF71-E4CE-B93302D30BEF}"/>
-          </ac:spMkLst>
-        </pc:spChg>
-        <pc:spChg chg="add mod">
-          <ac:chgData name="Luis guilherme De barros andrade faria" userId="31e40991-e7d9-41d2-8af0-eeeeb0b0a000" providerId="ADAL" clId="{B6554E97-654E-F047-A081-3F6DD18F8C3B}" dt="2025-08-13T09:30:22.428" v="4014" actId="207"/>
-          <ac:spMkLst>
-            <pc:docMk/>
-            <pc:sldMk cId="2969302973" sldId="259"/>
-            <ac:spMk id="17" creationId="{70C7C43F-65ED-D782-DF5B-3806636290B2}"/>
-          </ac:spMkLst>
-        </pc:spChg>
-        <pc:spChg chg="add mod">
-          <ac:chgData name="Luis guilherme De barros andrade faria" userId="31e40991-e7d9-41d2-8af0-eeeeb0b0a000" providerId="ADAL" clId="{B6554E97-654E-F047-A081-3F6DD18F8C3B}" dt="2025-08-13T09:30:22.428" v="4014" actId="207"/>
-          <ac:spMkLst>
-            <pc:docMk/>
-            <pc:sldMk cId="2969302973" sldId="259"/>
-            <ac:spMk id="18" creationId="{194D6274-89EA-4BD3-6984-03DEDCA5A09A}"/>
-          </ac:spMkLst>
-        </pc:spChg>
-        <pc:spChg chg="add mod">
-          <ac:chgData name="Luis guilherme De barros andrade faria" userId="31e40991-e7d9-41d2-8af0-eeeeb0b0a000" providerId="ADAL" clId="{B6554E97-654E-F047-A081-3F6DD18F8C3B}" dt="2025-08-13T09:27:34.741" v="3909" actId="1037"/>
-          <ac:spMkLst>
-            <pc:docMk/>
-            <pc:sldMk cId="2969302973" sldId="259"/>
-            <ac:spMk id="19" creationId="{7D135974-3BC4-96A7-6722-E794ADAABB67}"/>
-          </ac:spMkLst>
-        </pc:spChg>
-        <pc:spChg chg="add mod">
-          <ac:chgData name="Luis guilherme De barros andrade faria" userId="31e40991-e7d9-41d2-8af0-eeeeb0b0a000" providerId="ADAL" clId="{B6554E97-654E-F047-A081-3F6DD18F8C3B}" dt="2025-08-13T09:30:43.047" v="4044" actId="1036"/>
-          <ac:spMkLst>
-            <pc:docMk/>
-            <pc:sldMk cId="2969302973" sldId="259"/>
-            <ac:spMk id="20" creationId="{72A1AA41-1A77-4B66-E017-20BF6C1C2F06}"/>
-          </ac:spMkLst>
-        </pc:spChg>
-        <pc:spChg chg="add mod">
-          <ac:chgData name="Luis guilherme De barros andrade faria" userId="31e40991-e7d9-41d2-8af0-eeeeb0b0a000" providerId="ADAL" clId="{B6554E97-654E-F047-A081-3F6DD18F8C3B}" dt="2025-08-13T09:30:43.047" v="4044" actId="1036"/>
-          <ac:spMkLst>
-            <pc:docMk/>
-            <pc:sldMk cId="2969302973" sldId="259"/>
-            <ac:spMk id="21" creationId="{7EB0519F-2462-8FF5-8DBD-709296FE57B9}"/>
-          </ac:spMkLst>
-        </pc:spChg>
-        <pc:spChg chg="add mod">
-          <ac:chgData name="Luis guilherme De barros andrade faria" userId="31e40991-e7d9-41d2-8af0-eeeeb0b0a000" providerId="ADAL" clId="{B6554E97-654E-F047-A081-3F6DD18F8C3B}" dt="2025-08-13T09:29:57.251" v="4005" actId="27636"/>
-          <ac:spMkLst>
-            <pc:docMk/>
-            <pc:sldMk cId="2969302973" sldId="259"/>
-            <ac:spMk id="22" creationId="{78A598C2-5A70-9960-C251-D237A9496EF0}"/>
-          </ac:spMkLst>
-        </pc:spChg>
-        <pc:spChg chg="add mod">
-          <ac:chgData name="Luis guilherme De barros andrade faria" userId="31e40991-e7d9-41d2-8af0-eeeeb0b0a000" providerId="ADAL" clId="{B6554E97-654E-F047-A081-3F6DD18F8C3B}" dt="2025-08-13T09:29:57.249" v="4002" actId="27636"/>
-          <ac:spMkLst>
-            <pc:docMk/>
-            <pc:sldMk cId="2969302973" sldId="259"/>
-            <ac:spMk id="23" creationId="{C36A7559-8AD5-9558-AB8A-1C1AD6FEB6D4}"/>
-          </ac:spMkLst>
-        </pc:spChg>
-        <pc:spChg chg="add mod">
-          <ac:chgData name="Luis guilherme De barros andrade faria" userId="31e40991-e7d9-41d2-8af0-eeeeb0b0a000" providerId="ADAL" clId="{B6554E97-654E-F047-A081-3F6DD18F8C3B}" dt="2025-08-13T09:27:11.105" v="3848" actId="27636"/>
-          <ac:spMkLst>
-            <pc:docMk/>
-            <pc:sldMk cId="2969302973" sldId="259"/>
-            <ac:spMk id="24" creationId="{8BF04C17-9E74-BA73-308A-B368E3FFD6AA}"/>
-          </ac:spMkLst>
-        </pc:spChg>
-        <pc:spChg chg="add mod">
-          <ac:chgData name="Luis guilherme De barros andrade faria" userId="31e40991-e7d9-41d2-8af0-eeeeb0b0a000" providerId="ADAL" clId="{B6554E97-654E-F047-A081-3F6DD18F8C3B}" dt="2025-08-13T09:29:57.248" v="4001" actId="27636"/>
-          <ac:spMkLst>
-            <pc:docMk/>
-            <pc:sldMk cId="2969302973" sldId="259"/>
-            <ac:spMk id="25" creationId="{7C88D4C7-F1C9-5C47-CB21-B75E5B757D23}"/>
-          </ac:spMkLst>
-        </pc:spChg>
-        <pc:spChg chg="add mod">
-          <ac:chgData name="Luis guilherme De barros andrade faria" userId="31e40991-e7d9-41d2-8af0-eeeeb0b0a000" providerId="ADAL" clId="{B6554E97-654E-F047-A081-3F6DD18F8C3B}" dt="2025-08-13T09:30:43.047" v="4044" actId="1036"/>
-          <ac:spMkLst>
-            <pc:docMk/>
-            <pc:sldMk cId="2969302973" sldId="259"/>
-            <ac:spMk id="26" creationId="{09B288F3-1A31-741B-D3A1-57357A987A75}"/>
-          </ac:spMkLst>
-        </pc:spChg>
-        <pc:spChg chg="add mod">
-          <ac:chgData name="Luis guilherme De barros andrade faria" userId="31e40991-e7d9-41d2-8af0-eeeeb0b0a000" providerId="ADAL" clId="{B6554E97-654E-F047-A081-3F6DD18F8C3B}" dt="2025-08-13T09:29:57.250" v="4003" actId="27636"/>
-          <ac:spMkLst>
-            <pc:docMk/>
-            <pc:sldMk cId="2969302973" sldId="259"/>
-            <ac:spMk id="27" creationId="{E4F4F0CE-D9AB-52D3-A067-0388AF078684}"/>
-          </ac:spMkLst>
-        </pc:spChg>
-        <pc:spChg chg="add mod">
-          <ac:chgData name="Luis guilherme De barros andrade faria" userId="31e40991-e7d9-41d2-8af0-eeeeb0b0a000" providerId="ADAL" clId="{B6554E97-654E-F047-A081-3F6DD18F8C3B}" dt="2025-08-13T09:29:57.253" v="4007" actId="27636"/>
-          <ac:spMkLst>
-            <pc:docMk/>
-            <pc:sldMk cId="2969302973" sldId="259"/>
-            <ac:spMk id="28" creationId="{561A6C16-41D4-2D48-83B1-91B6C88BEA80}"/>
-          </ac:spMkLst>
-        </pc:spChg>
-        <pc:spChg chg="add mod">
-          <ac:chgData name="Luis guilherme De barros andrade faria" userId="31e40991-e7d9-41d2-8af0-eeeeb0b0a000" providerId="ADAL" clId="{B6554E97-654E-F047-A081-3F6DD18F8C3B}" dt="2025-08-13T09:30:43.047" v="4044" actId="1036"/>
-          <ac:spMkLst>
-            <pc:docMk/>
-            <pc:sldMk cId="2969302973" sldId="259"/>
-            <ac:spMk id="29" creationId="{7CD455AA-C745-E727-CA4C-98D254754BCF}"/>
-          </ac:spMkLst>
-        </pc:spChg>
-        <pc:spChg chg="add mod">
-          <ac:chgData name="Luis guilherme De barros andrade faria" userId="31e40991-e7d9-41d2-8af0-eeeeb0b0a000" providerId="ADAL" clId="{B6554E97-654E-F047-A081-3F6DD18F8C3B}" dt="2025-08-13T09:30:43.047" v="4044" actId="1036"/>
-          <ac:spMkLst>
-            <pc:docMk/>
-            <pc:sldMk cId="2969302973" sldId="259"/>
-            <ac:spMk id="30" creationId="{212A8469-9A6F-5280-8782-4AD46C682987}"/>
-          </ac:spMkLst>
-        </pc:spChg>
-        <pc:spChg chg="add mod">
-          <ac:chgData name="Luis guilherme De barros andrade faria" userId="31e40991-e7d9-41d2-8af0-eeeeb0b0a000" providerId="ADAL" clId="{B6554E97-654E-F047-A081-3F6DD18F8C3B}" dt="2025-08-13T09:29:57.247" v="4000" actId="27636"/>
-          <ac:spMkLst>
-            <pc:docMk/>
-            <pc:sldMk cId="2969302973" sldId="259"/>
-            <ac:spMk id="31" creationId="{13F1F593-6E2B-944D-B27F-F9D89DC5BEF6}"/>
-          </ac:spMkLst>
-        </pc:spChg>
-        <pc:spChg chg="add mod">
-          <ac:chgData name="Luis guilherme De barros andrade faria" userId="31e40991-e7d9-41d2-8af0-eeeeb0b0a000" providerId="ADAL" clId="{B6554E97-654E-F047-A081-3F6DD18F8C3B}" dt="2025-08-13T09:30:43.047" v="4044" actId="1036"/>
-          <ac:spMkLst>
-            <pc:docMk/>
-            <pc:sldMk cId="2969302973" sldId="259"/>
-            <ac:spMk id="32" creationId="{C22A045E-50A4-B50A-2F5C-26C79CDB3D7F}"/>
-          </ac:spMkLst>
-        </pc:spChg>
-        <pc:spChg chg="add mod">
-          <ac:chgData name="Luis guilherme De barros andrade faria" userId="31e40991-e7d9-41d2-8af0-eeeeb0b0a000" providerId="ADAL" clId="{B6554E97-654E-F047-A081-3F6DD18F8C3B}" dt="2025-08-13T09:21:51.939" v="3492"/>
-          <ac:spMkLst>
-            <pc:docMk/>
-            <pc:sldMk cId="2969302973" sldId="259"/>
-            <ac:spMk id="33" creationId="{C86D2B6E-1430-3095-2BB6-287579962881}"/>
-          </ac:spMkLst>
-        </pc:spChg>
-        <pc:spChg chg="add mod">
-          <ac:chgData name="Luis guilherme De barros andrade faria" userId="31e40991-e7d9-41d2-8af0-eeeeb0b0a000" providerId="ADAL" clId="{B6554E97-654E-F047-A081-3F6DD18F8C3B}" dt="2025-08-13T09:21:51.939" v="3492"/>
-          <ac:spMkLst>
-            <pc:docMk/>
-            <pc:sldMk cId="2969302973" sldId="259"/>
-            <ac:spMk id="34" creationId="{3CBC9F1A-5BB5-FE71-FEF5-9C66082EDE4D}"/>
-          </ac:spMkLst>
-        </pc:spChg>
-        <pc:spChg chg="add mod">
-          <ac:chgData name="Luis guilherme De barros andrade faria" userId="31e40991-e7d9-41d2-8af0-eeeeb0b0a000" providerId="ADAL" clId="{B6554E97-654E-F047-A081-3F6DD18F8C3B}" dt="2025-08-13T09:21:51.939" v="3492"/>
-          <ac:spMkLst>
-            <pc:docMk/>
-            <pc:sldMk cId="2969302973" sldId="259"/>
-            <ac:spMk id="35" creationId="{9353E01F-D4E0-28FF-C09F-E8E84589C008}"/>
-          </ac:spMkLst>
-        </pc:spChg>
-        <pc:spChg chg="add mod">
-          <ac:chgData name="Luis guilherme De barros andrade faria" userId="31e40991-e7d9-41d2-8af0-eeeeb0b0a000" providerId="ADAL" clId="{B6554E97-654E-F047-A081-3F6DD18F8C3B}" dt="2025-08-13T09:21:51.939" v="3492"/>
-          <ac:spMkLst>
-            <pc:docMk/>
-            <pc:sldMk cId="2969302973" sldId="259"/>
-            <ac:spMk id="36" creationId="{1C03F2D8-F478-63DB-5F87-80DB91F9D97D}"/>
-          </ac:spMkLst>
-        </pc:spChg>
-        <pc:spChg chg="add mod">
-          <ac:chgData name="Luis guilherme De barros andrade faria" userId="31e40991-e7d9-41d2-8af0-eeeeb0b0a000" providerId="ADAL" clId="{B6554E97-654E-F047-A081-3F6DD18F8C3B}" dt="2025-08-13T09:21:51.939" v="3492"/>
-          <ac:spMkLst>
-            <pc:docMk/>
-            <pc:sldMk cId="2969302973" sldId="259"/>
-            <ac:spMk id="37" creationId="{475FE312-C3DB-5ED0-50F0-C51876C9AEC8}"/>
-          </ac:spMkLst>
-        </pc:spChg>
-        <pc:spChg chg="add mod">
-          <ac:chgData name="Luis guilherme De barros andrade faria" userId="31e40991-e7d9-41d2-8af0-eeeeb0b0a000" providerId="ADAL" clId="{B6554E97-654E-F047-A081-3F6DD18F8C3B}" dt="2025-08-13T09:21:51.939" v="3492"/>
-          <ac:spMkLst>
-            <pc:docMk/>
-            <pc:sldMk cId="2969302973" sldId="259"/>
-            <ac:spMk id="38" creationId="{2501C156-3AF0-226E-5760-677812C71C9C}"/>
-          </ac:spMkLst>
-        </pc:spChg>
-        <pc:spChg chg="add mod">
-          <ac:chgData name="Luis guilherme De barros andrade faria" userId="31e40991-e7d9-41d2-8af0-eeeeb0b0a000" providerId="ADAL" clId="{B6554E97-654E-F047-A081-3F6DD18F8C3B}" dt="2025-08-13T09:30:22.428" v="4014" actId="207"/>
-          <ac:spMkLst>
-            <pc:docMk/>
-            <pc:sldMk cId="2969302973" sldId="259"/>
-            <ac:spMk id="39" creationId="{04301FAE-B23F-B1F7-CD36-30958EE97953}"/>
-          </ac:spMkLst>
-        </pc:spChg>
-        <pc:spChg chg="add mod">
-          <ac:chgData name="Luis guilherme De barros andrade faria" userId="31e40991-e7d9-41d2-8af0-eeeeb0b0a000" providerId="ADAL" clId="{B6554E97-654E-F047-A081-3F6DD18F8C3B}" dt="2025-08-13T09:30:22.428" v="4014" actId="207"/>
-          <ac:spMkLst>
-            <pc:docMk/>
-            <pc:sldMk cId="2969302973" sldId="259"/>
-            <ac:spMk id="40" creationId="{5C727ED6-B845-929C-47A1-017F5E48D6DB}"/>
-          </ac:spMkLst>
-        </pc:spChg>
-        <pc:spChg chg="add mod">
-          <ac:chgData name="Luis guilherme De barros andrade faria" userId="31e40991-e7d9-41d2-8af0-eeeeb0b0a000" providerId="ADAL" clId="{B6554E97-654E-F047-A081-3F6DD18F8C3B}" dt="2025-08-13T09:27:30.242" v="3890" actId="1037"/>
-          <ac:spMkLst>
-            <pc:docMk/>
-            <pc:sldMk cId="2969302973" sldId="259"/>
-            <ac:spMk id="41" creationId="{2AEF19A4-618A-1732-B022-D44E83936961}"/>
-          </ac:spMkLst>
-        </pc:spChg>
-        <pc:spChg chg="add mod">
-          <ac:chgData name="Luis guilherme De barros andrade faria" userId="31e40991-e7d9-41d2-8af0-eeeeb0b0a000" providerId="ADAL" clId="{B6554E97-654E-F047-A081-3F6DD18F8C3B}" dt="2025-08-13T09:30:43.047" v="4044" actId="1036"/>
-          <ac:spMkLst>
-            <pc:docMk/>
-            <pc:sldMk cId="2969302973" sldId="259"/>
-            <ac:spMk id="42" creationId="{10F29794-8F78-4B2D-0D95-BB533056C536}"/>
-          </ac:spMkLst>
-        </pc:spChg>
-        <pc:spChg chg="add mod">
-          <ac:chgData name="Luis guilherme De barros andrade faria" userId="31e40991-e7d9-41d2-8af0-eeeeb0b0a000" providerId="ADAL" clId="{B6554E97-654E-F047-A081-3F6DD18F8C3B}" dt="2025-08-13T09:30:43.047" v="4044" actId="1036"/>
-          <ac:spMkLst>
-            <pc:docMk/>
-            <pc:sldMk cId="2969302973" sldId="259"/>
-            <ac:spMk id="43" creationId="{E12E1B00-105E-DB0A-F915-CEB9506A8193}"/>
-          </ac:spMkLst>
-        </pc:spChg>
-        <pc:spChg chg="add mod">
-          <ac:chgData name="Luis guilherme De barros andrade faria" userId="31e40991-e7d9-41d2-8af0-eeeeb0b0a000" providerId="ADAL" clId="{B6554E97-654E-F047-A081-3F6DD18F8C3B}" dt="2025-08-13T09:30:43.047" v="4044" actId="1036"/>
-          <ac:spMkLst>
-            <pc:docMk/>
-            <pc:sldMk cId="2969302973" sldId="259"/>
-            <ac:spMk id="44" creationId="{41DEC08F-4993-75BE-FA90-B54D3318F2C4}"/>
-          </ac:spMkLst>
-        </pc:spChg>
-        <pc:spChg chg="add del mod">
-          <ac:chgData name="Luis guilherme De barros andrade faria" userId="31e40991-e7d9-41d2-8af0-eeeeb0b0a000" providerId="ADAL" clId="{B6554E97-654E-F047-A081-3F6DD18F8C3B}" dt="2025-08-13T09:26:59.459" v="3837"/>
-          <ac:spMkLst>
-            <pc:docMk/>
-            <pc:sldMk cId="2969302973" sldId="259"/>
-            <ac:spMk id="74" creationId="{C6FE0ADD-C0BC-8158-54D4-A9B4F1EEEE60}"/>
-          </ac:spMkLst>
-        </pc:spChg>
-        <pc:grpChg chg="add mod">
-          <ac:chgData name="Luis guilherme De barros andrade faria" userId="31e40991-e7d9-41d2-8af0-eeeeb0b0a000" providerId="ADAL" clId="{B6554E97-654E-F047-A081-3F6DD18F8C3B}" dt="2025-08-13T09:17:13.930" v="3121"/>
-          <ac:grpSpMkLst>
-            <pc:docMk/>
-            <pc:sldMk cId="2969302973" sldId="259"/>
-            <ac:grpSpMk id="6" creationId="{6AB0EA92-0698-096B-8872-0D66D97D71EF}"/>
-          </ac:grpSpMkLst>
-        </pc:grpChg>
-        <pc:grpChg chg="add mod">
-          <ac:chgData name="Luis guilherme De barros andrade faria" userId="31e40991-e7d9-41d2-8af0-eeeeb0b0a000" providerId="ADAL" clId="{B6554E97-654E-F047-A081-3F6DD18F8C3B}" dt="2025-08-13T09:17:13.930" v="3121"/>
-          <ac:grpSpMkLst>
-            <pc:docMk/>
-            <pc:sldMk cId="2969302973" sldId="259"/>
-            <ac:grpSpMk id="7" creationId="{20A0FEE4-5835-5E0C-F95C-AA6EFDFBA37D}"/>
-          </ac:grpSpMkLst>
-        </pc:grpChg>
-        <pc:grpChg chg="add mod">
-          <ac:chgData name="Luis guilherme De barros andrade faria" userId="31e40991-e7d9-41d2-8af0-eeeeb0b0a000" providerId="ADAL" clId="{B6554E97-654E-F047-A081-3F6DD18F8C3B}" dt="2025-08-13T09:17:13.930" v="3121"/>
-          <ac:grpSpMkLst>
-            <pc:docMk/>
-            <pc:sldMk cId="2969302973" sldId="259"/>
-            <ac:grpSpMk id="9" creationId="{C699E226-2A4C-E452-871B-EFD0F8875BC5}"/>
-          </ac:grpSpMkLst>
-        </pc:grpChg>
-        <pc:graphicFrameChg chg="add del mod modGraphic">
-          <ac:chgData name="Luis guilherme De barros andrade faria" userId="31e40991-e7d9-41d2-8af0-eeeeb0b0a000" providerId="ADAL" clId="{B6554E97-654E-F047-A081-3F6DD18F8C3B}" dt="2025-08-13T09:17:33.216" v="3126" actId="478"/>
-          <ac:graphicFrameMkLst>
-            <pc:docMk/>
-            <pc:sldMk cId="2969302973" sldId="259"/>
-            <ac:graphicFrameMk id="4" creationId="{33FA5165-7F19-4E7E-95EC-57924C99E217}"/>
-          </ac:graphicFrameMkLst>
-        </pc:graphicFrameChg>
-        <pc:picChg chg="del mod">
-          <ac:chgData name="Luis guilherme De barros andrade faria" userId="31e40991-e7d9-41d2-8af0-eeeeb0b0a000" providerId="ADAL" clId="{B6554E97-654E-F047-A081-3F6DD18F8C3B}" dt="2025-08-13T09:26:58.457" v="3835" actId="478"/>
-          <ac:picMkLst>
-            <pc:docMk/>
-            <pc:sldMk cId="2969302973" sldId="259"/>
-            <ac:picMk id="5" creationId="{32C1EFBA-D8C0-E129-4E20-589C29E384AB}"/>
-          </ac:picMkLst>
-        </pc:picChg>
-        <pc:cxnChg chg="add mod">
-          <ac:chgData name="Luis guilherme De barros andrade faria" userId="31e40991-e7d9-41d2-8af0-eeeeb0b0a000" providerId="ADAL" clId="{B6554E97-654E-F047-A081-3F6DD18F8C3B}" dt="2025-08-13T09:27:20.601" v="3862" actId="1038"/>
-          <ac:cxnSpMkLst>
-            <pc:docMk/>
-            <pc:sldMk cId="2969302973" sldId="259"/>
-            <ac:cxnSpMk id="46" creationId="{FB2D2B66-64C9-A9C2-6DE0-35803F66CB07}"/>
-          </ac:cxnSpMkLst>
-        </pc:cxnChg>
-        <pc:cxnChg chg="add">
-          <ac:chgData name="Luis guilherme De barros andrade faria" userId="31e40991-e7d9-41d2-8af0-eeeeb0b0a000" providerId="ADAL" clId="{B6554E97-654E-F047-A081-3F6DD18F8C3B}" dt="2025-08-13T09:22:31.269" v="3563" actId="11529"/>
-          <ac:cxnSpMkLst>
-            <pc:docMk/>
-            <pc:sldMk cId="2969302973" sldId="259"/>
-            <ac:cxnSpMk id="48" creationId="{D23DC4C7-9ED3-4F20-F675-2A069022964B}"/>
-          </ac:cxnSpMkLst>
-        </pc:cxnChg>
-        <pc:cxnChg chg="add del">
-          <ac:chgData name="Luis guilherme De barros andrade faria" userId="31e40991-e7d9-41d2-8af0-eeeeb0b0a000" providerId="ADAL" clId="{B6554E97-654E-F047-A081-3F6DD18F8C3B}" dt="2025-08-13T09:22:42.313" v="3565" actId="11529"/>
-          <ac:cxnSpMkLst>
-            <pc:docMk/>
-            <pc:sldMk cId="2969302973" sldId="259"/>
-            <ac:cxnSpMk id="50" creationId="{0169FFCA-274A-ADE4-55B1-A7F4A2EADAAA}"/>
-          </ac:cxnSpMkLst>
-        </pc:cxnChg>
-        <pc:cxnChg chg="add mod">
-          <ac:chgData name="Luis guilherme De barros andrade faria" userId="31e40991-e7d9-41d2-8af0-eeeeb0b0a000" providerId="ADAL" clId="{B6554E97-654E-F047-A081-3F6DD18F8C3B}" dt="2025-08-13T09:27:30.242" v="3890" actId="1037"/>
-          <ac:cxnSpMkLst>
-            <pc:docMk/>
-            <pc:sldMk cId="2969302973" sldId="259"/>
-            <ac:cxnSpMk id="52" creationId="{7FAB86EC-7DDE-C823-0BA3-1DE7DA142709}"/>
-          </ac:cxnSpMkLst>
-        </pc:cxnChg>
-        <pc:cxnChg chg="add mod">
-          <ac:chgData name="Luis guilherme De barros andrade faria" userId="31e40991-e7d9-41d2-8af0-eeeeb0b0a000" providerId="ADAL" clId="{B6554E97-654E-F047-A081-3F6DD18F8C3B}" dt="2025-08-13T09:27:52.885" v="3954" actId="1076"/>
-          <ac:cxnSpMkLst>
-            <pc:docMk/>
-            <pc:sldMk cId="2969302973" sldId="259"/>
-            <ac:cxnSpMk id="54" creationId="{3E7CCA22-49C6-B3B5-F363-AD728BF35538}"/>
-          </ac:cxnSpMkLst>
-        </pc:cxnChg>
-        <pc:cxnChg chg="add mod">
-          <ac:chgData name="Luis guilherme De barros andrade faria" userId="31e40991-e7d9-41d2-8af0-eeeeb0b0a000" providerId="ADAL" clId="{B6554E97-654E-F047-A081-3F6DD18F8C3B}" dt="2025-08-13T09:27:42.769" v="3929" actId="1037"/>
-          <ac:cxnSpMkLst>
-            <pc:docMk/>
-            <pc:sldMk cId="2969302973" sldId="259"/>
-            <ac:cxnSpMk id="56" creationId="{AB2E814B-D957-AB1C-4F21-AB13DA144B93}"/>
-          </ac:cxnSpMkLst>
-        </pc:cxnChg>
-        <pc:cxnChg chg="add mod">
-          <ac:chgData name="Luis guilherme De barros andrade faria" userId="31e40991-e7d9-41d2-8af0-eeeeb0b0a000" providerId="ADAL" clId="{B6554E97-654E-F047-A081-3F6DD18F8C3B}" dt="2025-08-13T09:27:47.637" v="3953" actId="1037"/>
-          <ac:cxnSpMkLst>
-            <pc:docMk/>
-            <pc:sldMk cId="2969302973" sldId="259"/>
-            <ac:cxnSpMk id="58" creationId="{4DE8F8A7-5BFA-D9B6-B0AE-D950B4208DD0}"/>
-          </ac:cxnSpMkLst>
-        </pc:cxnChg>
-        <pc:cxnChg chg="add mod">
-          <ac:chgData name="Luis guilherme De barros andrade faria" userId="31e40991-e7d9-41d2-8af0-eeeeb0b0a000" providerId="ADAL" clId="{B6554E97-654E-F047-A081-3F6DD18F8C3B}" dt="2025-08-13T09:30:02.170" v="4010" actId="14100"/>
-          <ac:cxnSpMkLst>
-            <pc:docMk/>
-            <pc:sldMk cId="2969302973" sldId="259"/>
-            <ac:cxnSpMk id="60" creationId="{547D0163-0746-0171-691D-433913A802A2}"/>
-          </ac:cxnSpMkLst>
-        </pc:cxnChg>
-        <pc:cxnChg chg="add mod">
-          <ac:chgData name="Luis guilherme De barros andrade faria" userId="31e40991-e7d9-41d2-8af0-eeeeb0b0a000" providerId="ADAL" clId="{B6554E97-654E-F047-A081-3F6DD18F8C3B}" dt="2025-08-13T09:30:04.552" v="4011" actId="14100"/>
-          <ac:cxnSpMkLst>
-            <pc:docMk/>
-            <pc:sldMk cId="2969302973" sldId="259"/>
-            <ac:cxnSpMk id="61" creationId="{466ABD02-FFC8-EA7B-1E73-F564F4953C7F}"/>
-          </ac:cxnSpMkLst>
-        </pc:cxnChg>
-        <pc:cxnChg chg="add mod">
-          <ac:chgData name="Luis guilherme De barros andrade faria" userId="31e40991-e7d9-41d2-8af0-eeeeb0b0a000" providerId="ADAL" clId="{B6554E97-654E-F047-A081-3F6DD18F8C3B}" dt="2025-08-13T09:27:59.626" v="3955" actId="14100"/>
-          <ac:cxnSpMkLst>
-            <pc:docMk/>
-            <pc:sldMk cId="2969302973" sldId="259"/>
-            <ac:cxnSpMk id="62" creationId="{905FF663-81C0-8D32-9AB4-874B2AF6F5F1}"/>
-          </ac:cxnSpMkLst>
-        </pc:cxnChg>
-        <pc:cxnChg chg="add mod">
-          <ac:chgData name="Luis guilherme De barros andrade faria" userId="31e40991-e7d9-41d2-8af0-eeeeb0b0a000" providerId="ADAL" clId="{B6554E97-654E-F047-A081-3F6DD18F8C3B}" dt="2025-08-13T09:28:04.332" v="3957" actId="14100"/>
-          <ac:cxnSpMkLst>
-            <pc:docMk/>
-            <pc:sldMk cId="2969302973" sldId="259"/>
-            <ac:cxnSpMk id="63" creationId="{6BD99D8C-753C-6462-6990-9B8211467C79}"/>
-          </ac:cxnSpMkLst>
-        </pc:cxnChg>
-        <pc:cxnChg chg="add mod">
-          <ac:chgData name="Luis guilherme De barros andrade faria" userId="31e40991-e7d9-41d2-8af0-eeeeb0b0a000" providerId="ADAL" clId="{B6554E97-654E-F047-A081-3F6DD18F8C3B}" dt="2025-08-13T09:28:58.374" v="3984" actId="14100"/>
-          <ac:cxnSpMkLst>
-            <pc:docMk/>
-            <pc:sldMk cId="2969302973" sldId="259"/>
-            <ac:cxnSpMk id="64" creationId="{8A4027B1-BFE1-1963-0043-4E52BCAAB136}"/>
-          </ac:cxnSpMkLst>
-        </pc:cxnChg>
-        <pc:cxnChg chg="add mod">
-          <ac:chgData name="Luis guilherme De barros andrade faria" userId="31e40991-e7d9-41d2-8af0-eeeeb0b0a000" providerId="ADAL" clId="{B6554E97-654E-F047-A081-3F6DD18F8C3B}" dt="2025-08-13T09:29:09.590" v="3992" actId="14100"/>
-          <ac:cxnSpMkLst>
-            <pc:docMk/>
-            <pc:sldMk cId="2969302973" sldId="259"/>
-            <ac:cxnSpMk id="65" creationId="{D48B0290-796A-9876-A7FD-1435E6B923D1}"/>
-          </ac:cxnSpMkLst>
-        </pc:cxnChg>
-        <pc:cxnChg chg="add del mod">
-          <ac:chgData name="Luis guilherme De barros andrade faria" userId="31e40991-e7d9-41d2-8af0-eeeeb0b0a000" providerId="ADAL" clId="{B6554E97-654E-F047-A081-3F6DD18F8C3B}" dt="2025-08-13T09:24:20.276" v="3648" actId="478"/>
-          <ac:cxnSpMkLst>
-            <pc:docMk/>
-            <pc:sldMk cId="2969302973" sldId="259"/>
-            <ac:cxnSpMk id="66" creationId="{5C9735E0-C130-1FE7-E8AD-24D79135D20C}"/>
-          </ac:cxnSpMkLst>
-        </pc:cxnChg>
-        <pc:cxnChg chg="add mod">
-          <ac:chgData name="Luis guilherme De barros andrade faria" userId="31e40991-e7d9-41d2-8af0-eeeeb0b0a000" providerId="ADAL" clId="{B6554E97-654E-F047-A081-3F6DD18F8C3B}" dt="2025-08-13T09:29:29.914" v="3996" actId="14100"/>
-          <ac:cxnSpMkLst>
-            <pc:docMk/>
-            <pc:sldMk cId="2969302973" sldId="259"/>
-            <ac:cxnSpMk id="68" creationId="{061B68AC-C173-A416-A9FF-92D2A8EB841D}"/>
-          </ac:cxnSpMkLst>
-        </pc:cxnChg>
-        <pc:cxnChg chg="add mod">
-          <ac:chgData name="Luis guilherme De barros andrade faria" userId="31e40991-e7d9-41d2-8af0-eeeeb0b0a000" providerId="ADAL" clId="{B6554E97-654E-F047-A081-3F6DD18F8C3B}" dt="2025-08-13T09:29:02.986" v="3987" actId="1036"/>
-          <ac:cxnSpMkLst>
-            <pc:docMk/>
-            <pc:sldMk cId="2969302973" sldId="259"/>
-            <ac:cxnSpMk id="69" creationId="{8252705E-1D91-900C-5C6B-22CADC80323B}"/>
-          </ac:cxnSpMkLst>
-        </pc:cxnChg>
-        <pc:cxnChg chg="add mod">
-          <ac:chgData name="Luis guilherme De barros andrade faria" userId="31e40991-e7d9-41d2-8af0-eeeeb0b0a000" providerId="ADAL" clId="{B6554E97-654E-F047-A081-3F6DD18F8C3B}" dt="2025-08-13T09:28:21.936" v="3960" actId="14100"/>
-          <ac:cxnSpMkLst>
-            <pc:docMk/>
-            <pc:sldMk cId="2969302973" sldId="259"/>
-            <ac:cxnSpMk id="71" creationId="{F7C191F5-2D24-B258-9D9A-963D53AD4A41}"/>
-          </ac:cxnSpMkLst>
-        </pc:cxnChg>
-        <pc:cxnChg chg="add mod">
-          <ac:chgData name="Luis guilherme De barros andrade faria" userId="31e40991-e7d9-41d2-8af0-eeeeb0b0a000" providerId="ADAL" clId="{B6554E97-654E-F047-A081-3F6DD18F8C3B}" dt="2025-08-13T09:28:26.135" v="3962" actId="14100"/>
-          <ac:cxnSpMkLst>
-            <pc:docMk/>
-            <pc:sldMk cId="2969302973" sldId="259"/>
-            <ac:cxnSpMk id="73" creationId="{79FE8D1F-5941-3E46-87CC-9648CC57E6F9}"/>
-          </ac:cxnSpMkLst>
-        </pc:cxnChg>
-      </pc:sldChg>
-      <pc:sldChg chg="modSp mod">
-        <pc:chgData name="Luis guilherme De barros andrade faria" userId="31e40991-e7d9-41d2-8af0-eeeeb0b0a000" providerId="ADAL" clId="{B6554E97-654E-F047-A081-3F6DD18F8C3B}" dt="2025-08-10T21:21:11.445" v="2853" actId="1076"/>
-        <pc:sldMkLst>
-          <pc:docMk/>
-          <pc:sldMk cId="1083875465" sldId="261"/>
-        </pc:sldMkLst>
-        <pc:spChg chg="mod">
-          <ac:chgData name="Luis guilherme De barros andrade faria" userId="31e40991-e7d9-41d2-8af0-eeeeb0b0a000" providerId="ADAL" clId="{B6554E97-654E-F047-A081-3F6DD18F8C3B}" dt="2025-08-10T21:21:11.445" v="2853" actId="1076"/>
-          <ac:spMkLst>
-            <pc:docMk/>
-            <pc:sldMk cId="1083875465" sldId="261"/>
-            <ac:spMk id="3" creationId="{F50607A3-6501-9AFC-CA09-5BB6CC46E19B}"/>
-          </ac:spMkLst>
-        </pc:spChg>
-        <pc:picChg chg="mod">
-          <ac:chgData name="Luis guilherme De barros andrade faria" userId="31e40991-e7d9-41d2-8af0-eeeeb0b0a000" providerId="ADAL" clId="{B6554E97-654E-F047-A081-3F6DD18F8C3B}" dt="2025-08-10T09:48:53.943" v="4" actId="1076"/>
-          <ac:picMkLst>
-            <pc:docMk/>
-            <pc:sldMk cId="1083875465" sldId="261"/>
-            <ac:picMk id="6" creationId="{27D04648-2C56-9A86-44F2-B12C71C1D72D}"/>
-          </ac:picMkLst>
-        </pc:picChg>
-      </pc:sldChg>
-      <pc:sldChg chg="addSp delSp modSp mod">
-        <pc:chgData name="Luis guilherme De barros andrade faria" userId="31e40991-e7d9-41d2-8af0-eeeeb0b0a000" providerId="ADAL" clId="{B6554E97-654E-F047-A081-3F6DD18F8C3B}" dt="2025-08-13T09:14:11.561" v="3113" actId="692"/>
-        <pc:sldMkLst>
-          <pc:docMk/>
-          <pc:sldMk cId="2354179793" sldId="262"/>
-        </pc:sldMkLst>
-        <pc:spChg chg="mod">
-          <ac:chgData name="Luis guilherme De barros andrade faria" userId="31e40991-e7d9-41d2-8af0-eeeeb0b0a000" providerId="ADAL" clId="{B6554E97-654E-F047-A081-3F6DD18F8C3B}" dt="2025-08-10T18:22:40.742" v="1254" actId="27636"/>
-          <ac:spMkLst>
-            <pc:docMk/>
-            <pc:sldMk cId="2354179793" sldId="262"/>
-            <ac:spMk id="2" creationId="{955AA314-AE02-4230-8EE1-5D7B0D6D4ACB}"/>
-          </ac:spMkLst>
-        </pc:spChg>
-        <pc:spChg chg="add mod">
-          <ac:chgData name="Luis guilherme De barros andrade faria" userId="31e40991-e7d9-41d2-8af0-eeeeb0b0a000" providerId="ADAL" clId="{B6554E97-654E-F047-A081-3F6DD18F8C3B}" dt="2025-08-13T09:10:40.405" v="2968" actId="1037"/>
-          <ac:spMkLst>
-            <pc:docMk/>
-            <pc:sldMk cId="2354179793" sldId="262"/>
-            <ac:spMk id="3" creationId="{89ADB987-7E48-64F1-ECC2-5D141B437646}"/>
-          </ac:spMkLst>
-        </pc:spChg>
-        <pc:spChg chg="add mod">
-          <ac:chgData name="Luis guilherme De barros andrade faria" userId="31e40991-e7d9-41d2-8af0-eeeeb0b0a000" providerId="ADAL" clId="{B6554E97-654E-F047-A081-3F6DD18F8C3B}" dt="2025-08-13T09:10:47.052" v="2995" actId="20577"/>
-          <ac:spMkLst>
-            <pc:docMk/>
-            <pc:sldMk cId="2354179793" sldId="262"/>
-            <ac:spMk id="5" creationId="{33209683-87E1-4B02-87EA-186D351A33F7}"/>
-          </ac:spMkLst>
-        </pc:spChg>
-        <pc:spChg chg="add mod">
-          <ac:chgData name="Luis guilherme De barros andrade faria" userId="31e40991-e7d9-41d2-8af0-eeeeb0b0a000" providerId="ADAL" clId="{B6554E97-654E-F047-A081-3F6DD18F8C3B}" dt="2025-08-13T09:11:45.395" v="3080"/>
-          <ac:spMkLst>
-            <pc:docMk/>
-            <pc:sldMk cId="2354179793" sldId="262"/>
-            <ac:spMk id="6" creationId="{24FEEC19-EF44-1023-02CC-8ED6D9217DF2}"/>
-          </ac:spMkLst>
-        </pc:spChg>
-        <pc:spChg chg="add mod">
-          <ac:chgData name="Luis guilherme De barros andrade faria" userId="31e40991-e7d9-41d2-8af0-eeeeb0b0a000" providerId="ADAL" clId="{B6554E97-654E-F047-A081-3F6DD18F8C3B}" dt="2025-08-13T09:11:49.404" v="3083"/>
-          <ac:spMkLst>
-            <pc:docMk/>
-            <pc:sldMk cId="2354179793" sldId="262"/>
-            <ac:spMk id="7" creationId="{C08F36FC-B64B-63A2-7EB4-F3ABE73B8D7D}"/>
-          </ac:spMkLst>
-        </pc:spChg>
-        <pc:spChg chg="add mod">
-          <ac:chgData name="Luis guilherme De barros andrade faria" userId="31e40991-e7d9-41d2-8af0-eeeeb0b0a000" providerId="ADAL" clId="{B6554E97-654E-F047-A081-3F6DD18F8C3B}" dt="2025-08-13T09:10:21.848" v="2952" actId="1037"/>
-          <ac:spMkLst>
-            <pc:docMk/>
-            <pc:sldMk cId="2354179793" sldId="262"/>
-            <ac:spMk id="9" creationId="{BB51F388-04B9-A785-5767-DA549EC254D3}"/>
-          </ac:spMkLst>
-        </pc:spChg>
-        <pc:spChg chg="add del mod">
-          <ac:chgData name="Luis guilherme De barros andrade faria" userId="31e40991-e7d9-41d2-8af0-eeeeb0b0a000" providerId="ADAL" clId="{B6554E97-654E-F047-A081-3F6DD18F8C3B}" dt="2025-08-13T09:13:37.373" v="3108" actId="14100"/>
-          <ac:spMkLst>
-            <pc:docMk/>
-            <pc:sldMk cId="2354179793" sldId="262"/>
-            <ac:spMk id="10" creationId="{3DAEF621-46FE-A374-4B92-011831C18CB5}"/>
-          </ac:spMkLst>
-        </pc:spChg>
-        <pc:spChg chg="add mod">
-          <ac:chgData name="Luis guilherme De barros andrade faria" userId="31e40991-e7d9-41d2-8af0-eeeeb0b0a000" providerId="ADAL" clId="{B6554E97-654E-F047-A081-3F6DD18F8C3B}" dt="2025-08-13T09:11:36.427" v="3078" actId="20577"/>
-          <ac:spMkLst>
-            <pc:docMk/>
-            <pc:sldMk cId="2354179793" sldId="262"/>
-            <ac:spMk id="13" creationId="{C8E7129A-6A93-69BD-621A-B0710E4EF252}"/>
-          </ac:spMkLst>
-        </pc:spChg>
-        <pc:spChg chg="add del mod">
-          <ac:chgData name="Luis guilherme De barros andrade faria" userId="31e40991-e7d9-41d2-8af0-eeeeb0b0a000" providerId="ADAL" clId="{B6554E97-654E-F047-A081-3F6DD18F8C3B}" dt="2025-08-13T09:10:40.588" v="2969" actId="478"/>
-          <ac:spMkLst>
-            <pc:docMk/>
-            <pc:sldMk cId="2354179793" sldId="262"/>
-            <ac:spMk id="14" creationId="{AADE633A-CE04-B812-9585-DF5D71152D28}"/>
-          </ac:spMkLst>
-        </pc:spChg>
-        <pc:graphicFrameChg chg="add mod modGraphic">
-          <ac:chgData name="Luis guilherme De barros andrade faria" userId="31e40991-e7d9-41d2-8af0-eeeeb0b0a000" providerId="ADAL" clId="{B6554E97-654E-F047-A081-3F6DD18F8C3B}" dt="2025-08-13T09:14:11.561" v="3113" actId="692"/>
-          <ac:graphicFrameMkLst>
-            <pc:docMk/>
-            <pc:sldMk cId="2354179793" sldId="262"/>
-            <ac:graphicFrameMk id="4" creationId="{A0960EC1-849A-BBC1-E481-3E7FE9292C8F}"/>
-          </ac:graphicFrameMkLst>
-        </pc:graphicFrameChg>
-      </pc:sldChg>
-      <pc:sldChg chg="addSp delSp modSp mod setBg">
-        <pc:chgData name="Luis guilherme De barros andrade faria" userId="31e40991-e7d9-41d2-8af0-eeeeb0b0a000" providerId="ADAL" clId="{B6554E97-654E-F047-A081-3F6DD18F8C3B}" dt="2025-08-10T21:12:06.607" v="2466" actId="1035"/>
-        <pc:sldMkLst>
-          <pc:docMk/>
-          <pc:sldMk cId="2107877928" sldId="263"/>
-        </pc:sldMkLst>
-        <pc:spChg chg="mod">
-          <ac:chgData name="Luis guilherme De barros andrade faria" userId="31e40991-e7d9-41d2-8af0-eeeeb0b0a000" providerId="ADAL" clId="{B6554E97-654E-F047-A081-3F6DD18F8C3B}" dt="2025-08-10T21:08:00.355" v="1650" actId="26606"/>
-          <ac:spMkLst>
-            <pc:docMk/>
-            <pc:sldMk cId="2107877928" sldId="263"/>
-            <ac:spMk id="2" creationId="{BEB1A209-7396-5E9E-DC76-D97DEBADA539}"/>
-          </ac:spMkLst>
-        </pc:spChg>
-        <pc:spChg chg="mod ord">
-          <ac:chgData name="Luis guilherme De barros andrade faria" userId="31e40991-e7d9-41d2-8af0-eeeeb0b0a000" providerId="ADAL" clId="{B6554E97-654E-F047-A081-3F6DD18F8C3B}" dt="2025-08-10T21:08:00.355" v="1650" actId="26606"/>
-          <ac:spMkLst>
-            <pc:docMk/>
-            <pc:sldMk cId="2107877928" sldId="263"/>
-            <ac:spMk id="3" creationId="{AFF252BB-3FA2-0F8C-5CDD-FFADE079B4AB}"/>
-          </ac:spMkLst>
-        </pc:spChg>
-        <pc:spChg chg="add mod">
-          <ac:chgData name="Luis guilherme De barros andrade faria" userId="31e40991-e7d9-41d2-8af0-eeeeb0b0a000" providerId="ADAL" clId="{B6554E97-654E-F047-A081-3F6DD18F8C3B}" dt="2025-08-10T21:09:27.420" v="2048" actId="207"/>
-          <ac:spMkLst>
-            <pc:docMk/>
-            <pc:sldMk cId="2107877928" sldId="263"/>
-            <ac:spMk id="14" creationId="{4ACFEAA7-EB1F-FF13-65F5-2D6DD3DF0545}"/>
-          </ac:spMkLst>
-        </pc:spChg>
-        <pc:spChg chg="add mod">
-          <ac:chgData name="Luis guilherme De barros andrade faria" userId="31e40991-e7d9-41d2-8af0-eeeeb0b0a000" providerId="ADAL" clId="{B6554E97-654E-F047-A081-3F6DD18F8C3B}" dt="2025-08-10T21:12:06.607" v="2466" actId="1035"/>
-          <ac:spMkLst>
-            <pc:docMk/>
-            <pc:sldMk cId="2107877928" sldId="263"/>
-            <ac:spMk id="15" creationId="{A69F4011-A396-DFD2-CC67-A78A60A66008}"/>
-          </ac:spMkLst>
-        </pc:spChg>
-        <pc:spChg chg="add">
-          <ac:chgData name="Luis guilherme De barros andrade faria" userId="31e40991-e7d9-41d2-8af0-eeeeb0b0a000" providerId="ADAL" clId="{B6554E97-654E-F047-A081-3F6DD18F8C3B}" dt="2025-08-10T21:08:00.355" v="1650" actId="26606"/>
-          <ac:spMkLst>
-            <pc:docMk/>
-            <pc:sldMk cId="2107877928" sldId="263"/>
-            <ac:spMk id="1038" creationId="{E49D7415-2F11-44C2-B6AA-13A25B6814B9}"/>
-          </ac:spMkLst>
-        </pc:spChg>
-        <pc:picChg chg="add mod">
-          <ac:chgData name="Luis guilherme De barros andrade faria" userId="31e40991-e7d9-41d2-8af0-eeeeb0b0a000" providerId="ADAL" clId="{B6554E97-654E-F047-A081-3F6DD18F8C3B}" dt="2025-08-10T21:08:06.842" v="1653"/>
-          <ac:picMkLst>
-            <pc:docMk/>
-            <pc:sldMk cId="2107877928" sldId="263"/>
-            <ac:picMk id="13" creationId="{8445BAAC-879C-06E3-9D0B-1B1BA0493CBE}"/>
-          </ac:picMkLst>
-        </pc:picChg>
-        <pc:picChg chg="add mod">
-          <ac:chgData name="Luis guilherme De barros andrade faria" userId="31e40991-e7d9-41d2-8af0-eeeeb0b0a000" providerId="ADAL" clId="{B6554E97-654E-F047-A081-3F6DD18F8C3B}" dt="2025-08-10T21:09:06.892" v="2042" actId="167"/>
-          <ac:picMkLst>
-            <pc:docMk/>
-            <pc:sldMk cId="2107877928" sldId="263"/>
-            <ac:picMk id="1028" creationId="{91C0567A-17DC-ADBE-CE12-66F67D490699}"/>
-          </ac:picMkLst>
-        </pc:picChg>
-        <pc:cxnChg chg="add">
-          <ac:chgData name="Luis guilherme De barros andrade faria" userId="31e40991-e7d9-41d2-8af0-eeeeb0b0a000" providerId="ADAL" clId="{B6554E97-654E-F047-A081-3F6DD18F8C3B}" dt="2025-08-10T21:08:00.355" v="1650" actId="26606"/>
-          <ac:cxnSpMkLst>
-            <pc:docMk/>
-            <pc:sldMk cId="2107877928" sldId="263"/>
-            <ac:cxnSpMk id="1040" creationId="{511FC409-B3C2-4F68-865C-C5333D6F2710}"/>
-          </ac:cxnSpMkLst>
-        </pc:cxnChg>
-        <pc:cxnChg chg="add">
-          <ac:chgData name="Luis guilherme De barros andrade faria" userId="31e40991-e7d9-41d2-8af0-eeeeb0b0a000" providerId="ADAL" clId="{B6554E97-654E-F047-A081-3F6DD18F8C3B}" dt="2025-08-10T21:08:00.355" v="1650" actId="26606"/>
-          <ac:cxnSpMkLst>
-            <pc:docMk/>
-            <pc:sldMk cId="2107877928" sldId="263"/>
-            <ac:cxnSpMk id="1042" creationId="{B810270D-76A7-44B3-9746-7EDF5788602E}"/>
-          </ac:cxnSpMkLst>
-        </pc:cxnChg>
-      </pc:sldChg>
-      <pc:sldChg chg="modSp del mod setBg">
-        <pc:chgData name="Luis guilherme De barros andrade faria" userId="31e40991-e7d9-41d2-8af0-eeeeb0b0a000" providerId="ADAL" clId="{B6554E97-654E-F047-A081-3F6DD18F8C3B}" dt="2025-08-10T21:19:50.858" v="2795" actId="2696"/>
-        <pc:sldMkLst>
-          <pc:docMk/>
-          <pc:sldMk cId="2631834832" sldId="265"/>
-        </pc:sldMkLst>
-      </pc:sldChg>
-      <pc:sldChg chg="addSp modSp add mod ord">
-        <pc:chgData name="Luis guilherme De barros andrade faria" userId="31e40991-e7d9-41d2-8af0-eeeeb0b0a000" providerId="ADAL" clId="{B6554E97-654E-F047-A081-3F6DD18F8C3B}" dt="2025-08-10T21:20:28.295" v="2850" actId="1035"/>
-        <pc:sldMkLst>
-          <pc:docMk/>
-          <pc:sldMk cId="1407146066" sldId="266"/>
-        </pc:sldMkLst>
-        <pc:spChg chg="mod">
-          <ac:chgData name="Luis guilherme De barros andrade faria" userId="31e40991-e7d9-41d2-8af0-eeeeb0b0a000" providerId="ADAL" clId="{B6554E97-654E-F047-A081-3F6DD18F8C3B}" dt="2025-08-10T21:13:53.229" v="2518" actId="20577"/>
-          <ac:spMkLst>
-            <pc:docMk/>
-            <pc:sldMk cId="1407146066" sldId="266"/>
-            <ac:spMk id="2" creationId="{A31BC02D-4843-421B-81DD-DE8DD7543740}"/>
-          </ac:spMkLst>
-        </pc:spChg>
-        <pc:spChg chg="mod">
-          <ac:chgData name="Luis guilherme De barros andrade faria" userId="31e40991-e7d9-41d2-8af0-eeeeb0b0a000" providerId="ADAL" clId="{B6554E97-654E-F047-A081-3F6DD18F8C3B}" dt="2025-08-10T21:20:28.295" v="2850" actId="1035"/>
-          <ac:spMkLst>
-            <pc:docMk/>
-            <pc:sldMk cId="1407146066" sldId="266"/>
-            <ac:spMk id="3" creationId="{6CCAA0EE-9CEF-EB70-5CC0-B6D06800E3F5}"/>
-          </ac:spMkLst>
-        </pc:spChg>
-        <pc:spChg chg="add mod">
-          <ac:chgData name="Luis guilherme De barros andrade faria" userId="31e40991-e7d9-41d2-8af0-eeeeb0b0a000" providerId="ADAL" clId="{B6554E97-654E-F047-A081-3F6DD18F8C3B}" dt="2025-08-10T21:20:28.295" v="2850" actId="1035"/>
-          <ac:spMkLst>
-            <pc:docMk/>
-            <pc:sldMk cId="1407146066" sldId="266"/>
-            <ac:spMk id="10" creationId="{00AA06D0-0C38-ECBB-F3E3-69C2F27706EB}"/>
-          </ac:spMkLst>
-        </pc:spChg>
-        <pc:spChg chg="add mod">
-          <ac:chgData name="Luis guilherme De barros andrade faria" userId="31e40991-e7d9-41d2-8af0-eeeeb0b0a000" providerId="ADAL" clId="{B6554E97-654E-F047-A081-3F6DD18F8C3B}" dt="2025-08-10T21:20:10.814" v="2796" actId="1076"/>
-          <ac:spMkLst>
-            <pc:docMk/>
-            <pc:sldMk cId="1407146066" sldId="266"/>
-            <ac:spMk id="11" creationId="{96B125D8-99EA-9781-95D2-B6E136732844}"/>
-          </ac:spMkLst>
-        </pc:spChg>
-        <pc:spChg chg="add mod">
-          <ac:chgData name="Luis guilherme De barros andrade faria" userId="31e40991-e7d9-41d2-8af0-eeeeb0b0a000" providerId="ADAL" clId="{B6554E97-654E-F047-A081-3F6DD18F8C3B}" dt="2025-08-10T21:20:10.814" v="2796" actId="1076"/>
-          <ac:spMkLst>
-            <pc:docMk/>
-            <pc:sldMk cId="1407146066" sldId="266"/>
-            <ac:spMk id="13" creationId="{28A3BC41-4DF3-B81A-90C3-67B820071547}"/>
-          </ac:spMkLst>
-        </pc:spChg>
-        <pc:picChg chg="add mod">
-          <ac:chgData name="Luis guilherme De barros andrade faria" userId="31e40991-e7d9-41d2-8af0-eeeeb0b0a000" providerId="ADAL" clId="{B6554E97-654E-F047-A081-3F6DD18F8C3B}" dt="2025-08-10T21:20:28.295" v="2850" actId="1035"/>
-          <ac:picMkLst>
-            <pc:docMk/>
-            <pc:sldMk cId="1407146066" sldId="266"/>
-            <ac:picMk id="5" creationId="{4114905F-85A1-8593-A6C2-309D118287A9}"/>
-          </ac:picMkLst>
-        </pc:picChg>
-        <pc:picChg chg="mod">
-          <ac:chgData name="Luis guilherme De barros andrade faria" userId="31e40991-e7d9-41d2-8af0-eeeeb0b0a000" providerId="ADAL" clId="{B6554E97-654E-F047-A081-3F6DD18F8C3B}" dt="2025-08-10T21:14:38.056" v="2605" actId="1076"/>
-          <ac:picMkLst>
-            <pc:docMk/>
-            <pc:sldMk cId="1407146066" sldId="266"/>
-            <ac:picMk id="6" creationId="{B8B0E734-D718-461E-588C-D2AB8A43BAF0}"/>
-          </ac:picMkLst>
-        </pc:picChg>
-        <pc:picChg chg="add mod">
-          <ac:chgData name="Luis guilherme De barros andrade faria" userId="31e40991-e7d9-41d2-8af0-eeeeb0b0a000" providerId="ADAL" clId="{B6554E97-654E-F047-A081-3F6DD18F8C3B}" dt="2025-08-10T21:20:28.295" v="2850" actId="1035"/>
-          <ac:picMkLst>
-            <pc:docMk/>
-            <pc:sldMk cId="1407146066" sldId="266"/>
-            <ac:picMk id="7" creationId="{A315387F-4A38-1A58-4889-24159E6971DA}"/>
-          </ac:picMkLst>
-        </pc:picChg>
-        <pc:picChg chg="add mod">
-          <ac:chgData name="Luis guilherme De barros andrade faria" userId="31e40991-e7d9-41d2-8af0-eeeeb0b0a000" providerId="ADAL" clId="{B6554E97-654E-F047-A081-3F6DD18F8C3B}" dt="2025-08-10T21:20:28.295" v="2850" actId="1035"/>
-          <ac:picMkLst>
-            <pc:docMk/>
-            <pc:sldMk cId="1407146066" sldId="266"/>
-            <ac:picMk id="8" creationId="{D70D8F6A-EDB9-E9A6-43BA-83E13F3C92E3}"/>
-          </ac:picMkLst>
-        </pc:picChg>
-        <pc:picChg chg="add mod">
-          <ac:chgData name="Luis guilherme De barros andrade faria" userId="31e40991-e7d9-41d2-8af0-eeeeb0b0a000" providerId="ADAL" clId="{B6554E97-654E-F047-A081-3F6DD18F8C3B}" dt="2025-08-10T21:20:28.295" v="2850" actId="1035"/>
-          <ac:picMkLst>
-            <pc:docMk/>
-            <pc:sldMk cId="1407146066" sldId="266"/>
-            <ac:picMk id="9" creationId="{56864825-9FF9-74A8-019F-200765EF51AD}"/>
-          </ac:picMkLst>
-        </pc:picChg>
-        <pc:picChg chg="add mod">
-          <ac:chgData name="Luis guilherme De barros andrade faria" userId="31e40991-e7d9-41d2-8af0-eeeeb0b0a000" providerId="ADAL" clId="{B6554E97-654E-F047-A081-3F6DD18F8C3B}" dt="2025-08-10T21:20:10.814" v="2796" actId="1076"/>
-          <ac:picMkLst>
-            <pc:docMk/>
-            <pc:sldMk cId="1407146066" sldId="266"/>
-            <ac:picMk id="12" creationId="{B617C8B4-4AF0-9CAF-439F-0D803B199CF0}"/>
-          </ac:picMkLst>
-        </pc:picChg>
-        <pc:picChg chg="mod">
-          <ac:chgData name="Luis guilherme De barros andrade faria" userId="31e40991-e7d9-41d2-8af0-eeeeb0b0a000" providerId="ADAL" clId="{B6554E97-654E-F047-A081-3F6DD18F8C3B}" dt="2025-08-10T21:15:05.805" v="2621" actId="14100"/>
-          <ac:picMkLst>
-            <pc:docMk/>
-            <pc:sldMk cId="1407146066" sldId="266"/>
-            <ac:picMk id="1026" creationId="{97AD8713-3B23-2FBE-0B73-D50DE59E111E}"/>
-          </ac:picMkLst>
-        </pc:picChg>
-      </pc:sldChg>
-      <pc:sldChg chg="addSp delSp add del setBg delDesignElem">
-        <pc:chgData name="Luis guilherme De barros andrade faria" userId="31e40991-e7d9-41d2-8af0-eeeeb0b0a000" providerId="ADAL" clId="{B6554E97-654E-F047-A081-3F6DD18F8C3B}" dt="2025-08-10T21:13:27.464" v="2493"/>
-        <pc:sldMkLst>
-          <pc:docMk/>
-          <pc:sldMk cId="2570024290" sldId="266"/>
-        </pc:sldMkLst>
-      </pc:sldChg>
-      <pc:sldChg chg="addSp delSp modSp new add del mod setBg modClrScheme chgLayout">
-        <pc:chgData name="Luis guilherme De barros andrade faria" userId="31e40991-e7d9-41d2-8af0-eeeeb0b0a000" providerId="ADAL" clId="{B6554E97-654E-F047-A081-3F6DD18F8C3B}" dt="2025-08-10T18:22:09.672" v="1250" actId="2696"/>
-        <pc:sldMkLst>
-          <pc:docMk/>
-          <pc:sldMk cId="4015526024" sldId="266"/>
-        </pc:sldMkLst>
-      </pc:sldChg>
-      <pc:sldChg chg="modSp add del mod">
-        <pc:chgData name="Luis guilherme De barros andrade faria" userId="31e40991-e7d9-41d2-8af0-eeeeb0b0a000" providerId="ADAL" clId="{B6554E97-654E-F047-A081-3F6DD18F8C3B}" dt="2025-08-11T01:30:30.018" v="2866" actId="2696"/>
-        <pc:sldMkLst>
-          <pc:docMk/>
-          <pc:sldMk cId="1854725457" sldId="267"/>
-        </pc:sldMkLst>
-      </pc:sldChg>
-      <pc:sldChg chg="addSp delSp modSp new del mod setBg">
-        <pc:chgData name="Luis guilherme De barros andrade faria" userId="31e40991-e7d9-41d2-8af0-eeeeb0b0a000" providerId="ADAL" clId="{B6554E97-654E-F047-A081-3F6DD18F8C3B}" dt="2025-08-10T18:22:04.436" v="1236" actId="680"/>
-        <pc:sldMkLst>
-          <pc:docMk/>
-          <pc:sldMk cId="2327041304" sldId="267"/>
-        </pc:sldMkLst>
-      </pc:sldChg>
-    </pc:docChg>
-  </pc:docChgLst>
-  <pc:docChgLst>
-    <pc:chgData name="Luis guilherme De barros andrade faria" userId="S::luis.faria@student.torrens.edu.au::31e40991-e7d9-41d2-8af0-eeeeb0b0a000" providerId="AD" clId="Web-{199BB013-CB34-C1DA-C43E-FAC66CCDD483}"/>
-    <pc:docChg chg="modSld">
-      <pc:chgData name="Luis guilherme De barros andrade faria" userId="S::luis.faria@student.torrens.edu.au::31e40991-e7d9-41d2-8af0-eeeeb0b0a000" providerId="AD" clId="Web-{199BB013-CB34-C1DA-C43E-FAC66CCDD483}" dt="2025-08-09T22:37:05.802" v="41" actId="1076"/>
-      <pc:docMkLst>
-        <pc:docMk/>
-      </pc:docMkLst>
-      <pc:sldChg chg="addSp delSp modSp">
-        <pc:chgData name="Luis guilherme De barros andrade faria" userId="S::luis.faria@student.torrens.edu.au::31e40991-e7d9-41d2-8af0-eeeeb0b0a000" providerId="AD" clId="Web-{199BB013-CB34-C1DA-C43E-FAC66CCDD483}" dt="2025-08-09T22:37:05.802" v="41" actId="1076"/>
-        <pc:sldMkLst>
-          <pc:docMk/>
-          <pc:sldMk cId="289368279" sldId="257"/>
-        </pc:sldMkLst>
-        <pc:spChg chg="mod">
-          <ac:chgData name="Luis guilherme De barros andrade faria" userId="S::luis.faria@student.torrens.edu.au::31e40991-e7d9-41d2-8af0-eeeeb0b0a000" providerId="AD" clId="Web-{199BB013-CB34-C1DA-C43E-FAC66CCDD483}" dt="2025-08-09T22:37:04.880" v="40" actId="1076"/>
-          <ac:spMkLst>
-            <pc:docMk/>
-            <pc:sldMk cId="289368279" sldId="257"/>
-            <ac:spMk id="2" creationId="{33AA03FC-5505-7C29-91D2-1738A46F72D2}"/>
-          </ac:spMkLst>
-        </pc:spChg>
-        <pc:spChg chg="mod ord">
-          <ac:chgData name="Luis guilherme De barros andrade faria" userId="S::luis.faria@student.torrens.edu.au::31e40991-e7d9-41d2-8af0-eeeeb0b0a000" providerId="AD" clId="Web-{199BB013-CB34-C1DA-C43E-FAC66CCDD483}" dt="2025-08-09T22:36:45.801" v="34" actId="20577"/>
-          <ac:spMkLst>
-            <pc:docMk/>
-            <pc:sldMk cId="289368279" sldId="257"/>
-            <ac:spMk id="3" creationId="{A4AFB0F5-03C3-BE28-1ADB-7363705150CD}"/>
-          </ac:spMkLst>
-        </pc:spChg>
-        <pc:spChg chg="add mod">
-          <ac:chgData name="Luis guilherme De barros andrade faria" userId="S::luis.faria@student.torrens.edu.au::31e40991-e7d9-41d2-8af0-eeeeb0b0a000" providerId="AD" clId="Web-{199BB013-CB34-C1DA-C43E-FAC66CCDD483}" dt="2025-08-09T22:37:05.802" v="41" actId="1076"/>
-          <ac:spMkLst>
-            <pc:docMk/>
-            <pc:sldMk cId="289368279" sldId="257"/>
-            <ac:spMk id="7" creationId="{9C217547-4026-244C-AB7F-4ECEFFCEDAA5}"/>
-          </ac:spMkLst>
-        </pc:spChg>
-        <pc:picChg chg="mod">
-          <ac:chgData name="Luis guilherme De barros andrade faria" userId="S::luis.faria@student.torrens.edu.au::31e40991-e7d9-41d2-8af0-eeeeb0b0a000" providerId="AD" clId="Web-{199BB013-CB34-C1DA-C43E-FAC66CCDD483}" dt="2025-08-09T22:35:33.455" v="12" actId="14100"/>
-          <ac:picMkLst>
-            <pc:docMk/>
-            <pc:sldMk cId="289368279" sldId="257"/>
-            <ac:picMk id="4" creationId="{24848625-DE84-C1BD-DC37-9155E7413A79}"/>
-          </ac:picMkLst>
-        </pc:picChg>
-      </pc:sldChg>
-    </pc:docChg>
-  </pc:docChgLst>
-  <pc:docChgLst>
-    <pc:chgData name="Luis guilherme De barros andrade faria" userId="31e40991-e7d9-41d2-8af0-eeeeb0b0a000" providerId="ADAL" clId="{DAA07AB9-DC8B-0C40-9168-19E4FEC49E4E}"/>
-    <pc:docChg chg="undo custSel modSld">
-      <pc:chgData name="Luis guilherme De barros andrade faria" userId="31e40991-e7d9-41d2-8af0-eeeeb0b0a000" providerId="ADAL" clId="{DAA07AB9-DC8B-0C40-9168-19E4FEC49E4E}" dt="2025-07-30T10:00:37.898" v="182" actId="20577"/>
-      <pc:docMkLst>
-        <pc:docMk/>
-      </pc:docMkLst>
-      <pc:sldChg chg="addSp delSp modSp mod addAnim delAnim setClrOvrMap">
-        <pc:chgData name="Luis guilherme De barros andrade faria" userId="31e40991-e7d9-41d2-8af0-eeeeb0b0a000" providerId="ADAL" clId="{DAA07AB9-DC8B-0C40-9168-19E4FEC49E4E}" dt="2025-07-30T10:00:37.898" v="182" actId="20577"/>
-        <pc:sldMkLst>
-          <pc:docMk/>
-          <pc:sldMk cId="109857222" sldId="256"/>
-        </pc:sldMkLst>
-        <pc:spChg chg="mod">
-          <ac:chgData name="Luis guilherme De barros andrade faria" userId="31e40991-e7d9-41d2-8af0-eeeeb0b0a000" providerId="ADAL" clId="{DAA07AB9-DC8B-0C40-9168-19E4FEC49E4E}" dt="2025-07-30T09:54:42.801" v="148" actId="1037"/>
-          <ac:spMkLst>
-            <pc:docMk/>
-            <pc:sldMk cId="109857222" sldId="256"/>
-            <ac:spMk id="2" creationId="{00000000-0000-0000-0000-000000000000}"/>
-          </ac:spMkLst>
-        </pc:spChg>
-        <pc:spChg chg="mod">
-          <ac:chgData name="Luis guilherme De barros andrade faria" userId="31e40991-e7d9-41d2-8af0-eeeeb0b0a000" providerId="ADAL" clId="{DAA07AB9-DC8B-0C40-9168-19E4FEC49E4E}" dt="2025-07-30T10:00:37.898" v="182" actId="20577"/>
-          <ac:spMkLst>
-            <pc:docMk/>
-            <pc:sldMk cId="109857222" sldId="256"/>
-            <ac:spMk id="3" creationId="{00000000-0000-0000-0000-000000000000}"/>
-          </ac:spMkLst>
-        </pc:spChg>
-        <pc:picChg chg="add mod ord">
-          <ac:chgData name="Luis guilherme De barros andrade faria" userId="31e40991-e7d9-41d2-8af0-eeeeb0b0a000" providerId="ADAL" clId="{DAA07AB9-DC8B-0C40-9168-19E4FEC49E4E}" dt="2025-07-30T09:55:04.111" v="156" actId="1076"/>
-          <ac:picMkLst>
-            <pc:docMk/>
-            <pc:sldMk cId="109857222" sldId="256"/>
-            <ac:picMk id="1026" creationId="{69417FC9-1C49-F25C-233D-4A85ACC83FD5}"/>
-          </ac:picMkLst>
-        </pc:picChg>
-      </pc:sldChg>
-    </pc:docChg>
-  </pc:docChgLst>
-  <pc:docChgLst>
-    <pc:chgData name="Luis guilherme De barros andrade faria" userId="S::luis.faria@student.torrens.edu.au::31e40991-e7d9-41d2-8af0-eeeeb0b0a000" providerId="AD" clId="Web-{4C6DD4A7-F0FB-8405-FC1A-6AA07854EB2A}"/>
-    <pc:docChg chg="modSld">
-      <pc:chgData name="Luis guilherme De barros andrade faria" userId="S::luis.faria@student.torrens.edu.au::31e40991-e7d9-41d2-8af0-eeeeb0b0a000" providerId="AD" clId="Web-{4C6DD4A7-F0FB-8405-FC1A-6AA07854EB2A}" dt="2025-08-09T23:04:55.013" v="402" actId="20577"/>
-      <pc:docMkLst>
-        <pc:docMk/>
-      </pc:docMkLst>
-      <pc:sldChg chg="addSp delSp modSp">
-        <pc:chgData name="Luis guilherme De barros andrade faria" userId="S::luis.faria@student.torrens.edu.au::31e40991-e7d9-41d2-8af0-eeeeb0b0a000" providerId="AD" clId="Web-{4C6DD4A7-F0FB-8405-FC1A-6AA07854EB2A}" dt="2025-08-09T22:54:38.523" v="265" actId="1076"/>
-        <pc:sldMkLst>
-          <pc:docMk/>
-          <pc:sldMk cId="289368279" sldId="257"/>
-        </pc:sldMkLst>
-        <pc:spChg chg="mod">
-          <ac:chgData name="Luis guilherme De barros andrade faria" userId="S::luis.faria@student.torrens.edu.au::31e40991-e7d9-41d2-8af0-eeeeb0b0a000" providerId="AD" clId="Web-{4C6DD4A7-F0FB-8405-FC1A-6AA07854EB2A}" dt="2025-08-09T22:39:16.798" v="16" actId="1076"/>
-          <ac:spMkLst>
-            <pc:docMk/>
-            <pc:sldMk cId="289368279" sldId="257"/>
-            <ac:spMk id="2" creationId="{33AA03FC-5505-7C29-91D2-1738A46F72D2}"/>
-          </ac:spMkLst>
-        </pc:spChg>
-        <pc:spChg chg="mod">
-          <ac:chgData name="Luis guilherme De barros andrade faria" userId="S::luis.faria@student.torrens.edu.au::31e40991-e7d9-41d2-8af0-eeeeb0b0a000" providerId="AD" clId="Web-{4C6DD4A7-F0FB-8405-FC1A-6AA07854EB2A}" dt="2025-08-09T22:53:14.475" v="251" actId="14100"/>
-          <ac:spMkLst>
-            <pc:docMk/>
-            <pc:sldMk cId="289368279" sldId="257"/>
-            <ac:spMk id="3" creationId="{A4AFB0F5-03C3-BE28-1ADB-7363705150CD}"/>
-          </ac:spMkLst>
-        </pc:spChg>
-        <pc:spChg chg="mod">
-          <ac:chgData name="Luis guilherme De barros andrade faria" userId="S::luis.faria@student.torrens.edu.au::31e40991-e7d9-41d2-8af0-eeeeb0b0a000" providerId="AD" clId="Web-{4C6DD4A7-F0FB-8405-FC1A-6AA07854EB2A}" dt="2025-08-09T22:38:48.095" v="11"/>
-          <ac:spMkLst>
-            <pc:docMk/>
-            <pc:sldMk cId="289368279" sldId="257"/>
-            <ac:spMk id="7" creationId="{9C217547-4026-244C-AB7F-4ECEFFCEDAA5}"/>
-          </ac:spMkLst>
-        </pc:spChg>
-        <pc:spChg chg="add mod">
-          <ac:chgData name="Luis guilherme De barros andrade faria" userId="S::luis.faria@student.torrens.edu.au::31e40991-e7d9-41d2-8af0-eeeeb0b0a000" providerId="AD" clId="Web-{4C6DD4A7-F0FB-8405-FC1A-6AA07854EB2A}" dt="2025-08-09T22:53:52.663" v="253"/>
-          <ac:spMkLst>
-            <pc:docMk/>
-            <pc:sldMk cId="289368279" sldId="257"/>
-            <ac:spMk id="18" creationId="{B2AE0386-7363-6143-A98A-7D8491E94E41}"/>
-          </ac:spMkLst>
-        </pc:spChg>
-        <pc:spChg chg="add mod">
-          <ac:chgData name="Luis guilherme De barros andrade faria" userId="S::luis.faria@student.torrens.edu.au::31e40991-e7d9-41d2-8af0-eeeeb0b0a000" providerId="AD" clId="Web-{4C6DD4A7-F0FB-8405-FC1A-6AA07854EB2A}" dt="2025-08-09T22:53:52.663" v="254"/>
-          <ac:spMkLst>
-            <pc:docMk/>
-            <pc:sldMk cId="289368279" sldId="257"/>
-            <ac:spMk id="20" creationId="{88230EB8-8197-ACA9-8310-8C14F77A8F6F}"/>
-          </ac:spMkLst>
-        </pc:spChg>
-        <pc:spChg chg="add mod">
-          <ac:chgData name="Luis guilherme De barros andrade faria" userId="S::luis.faria@student.torrens.edu.au::31e40991-e7d9-41d2-8af0-eeeeb0b0a000" providerId="AD" clId="Web-{4C6DD4A7-F0FB-8405-FC1A-6AA07854EB2A}" dt="2025-08-09T22:54:34.289" v="264" actId="1076"/>
-          <ac:spMkLst>
-            <pc:docMk/>
-            <pc:sldMk cId="289368279" sldId="257"/>
-            <ac:spMk id="25" creationId="{1CCB1A03-0766-9729-AD52-863D6171FF37}"/>
-          </ac:spMkLst>
-        </pc:spChg>
-        <pc:spChg chg="add mod">
-          <ac:chgData name="Luis guilherme De barros andrade faria" userId="S::luis.faria@student.torrens.edu.au::31e40991-e7d9-41d2-8af0-eeeeb0b0a000" providerId="AD" clId="Web-{4C6DD4A7-F0FB-8405-FC1A-6AA07854EB2A}" dt="2025-08-09T22:51:25.896" v="232" actId="1076"/>
-          <ac:spMkLst>
-            <pc:docMk/>
-            <pc:sldMk cId="289368279" sldId="257"/>
-            <ac:spMk id="26" creationId="{AFFE0A99-C5E2-A2EA-A1FB-C3F05DD3E942}"/>
-          </ac:spMkLst>
-        </pc:spChg>
-        <pc:spChg chg="add mod">
-          <ac:chgData name="Luis guilherme De barros andrade faria" userId="S::luis.faria@student.torrens.edu.au::31e40991-e7d9-41d2-8af0-eeeeb0b0a000" providerId="AD" clId="Web-{4C6DD4A7-F0FB-8405-FC1A-6AA07854EB2A}" dt="2025-08-09T22:51:19.021" v="230" actId="14100"/>
-          <ac:spMkLst>
-            <pc:docMk/>
-            <pc:sldMk cId="289368279" sldId="257"/>
-            <ac:spMk id="27" creationId="{0F23CC5C-369B-3329-7F28-BAD0EB3B63B6}"/>
-          </ac:spMkLst>
-        </pc:spChg>
-        <pc:spChg chg="add mod">
-          <ac:chgData name="Luis guilherme De barros andrade faria" userId="S::luis.faria@student.torrens.edu.au::31e40991-e7d9-41d2-8af0-eeeeb0b0a000" providerId="AD" clId="Web-{4C6DD4A7-F0FB-8405-FC1A-6AA07854EB2A}" dt="2025-08-09T22:54:18.461" v="261"/>
-          <ac:spMkLst>
-            <pc:docMk/>
-            <pc:sldMk cId="289368279" sldId="257"/>
-            <ac:spMk id="28" creationId="{8B0DF089-A578-74FD-1782-DE635B0226C3}"/>
-          </ac:spMkLst>
-        </pc:spChg>
-        <pc:spChg chg="add mod">
-          <ac:chgData name="Luis guilherme De barros andrade faria" userId="S::luis.faria@student.torrens.edu.au::31e40991-e7d9-41d2-8af0-eeeeb0b0a000" providerId="AD" clId="Web-{4C6DD4A7-F0FB-8405-FC1A-6AA07854EB2A}" dt="2025-08-09T22:54:38.523" v="265" actId="1076"/>
-          <ac:spMkLst>
-            <pc:docMk/>
-            <pc:sldMk cId="289368279" sldId="257"/>
-            <ac:spMk id="29" creationId="{0052D1CF-E095-AF1C-D429-8AA829376B2A}"/>
-          </ac:spMkLst>
-        </pc:spChg>
-        <pc:picChg chg="add del mod modCrop">
-          <ac:chgData name="Luis guilherme De barros andrade faria" userId="S::luis.faria@student.torrens.edu.au::31e40991-e7d9-41d2-8af0-eeeeb0b0a000" providerId="AD" clId="Web-{4C6DD4A7-F0FB-8405-FC1A-6AA07854EB2A}" dt="2025-08-09T22:52:38.834" v="246"/>
-          <ac:picMkLst>
-            <pc:docMk/>
-            <pc:sldMk cId="289368279" sldId="257"/>
-            <ac:picMk id="4" creationId="{24848625-DE84-C1BD-DC37-9155E7413A79}"/>
-          </ac:picMkLst>
-        </pc:picChg>
-        <pc:picChg chg="add mod">
-          <ac:chgData name="Luis guilherme De barros andrade faria" userId="S::luis.faria@student.torrens.edu.au::31e40991-e7d9-41d2-8af0-eeeeb0b0a000" providerId="AD" clId="Web-{4C6DD4A7-F0FB-8405-FC1A-6AA07854EB2A}" dt="2025-08-09T22:47:02.895" v="106" actId="14100"/>
-          <ac:picMkLst>
-            <pc:docMk/>
-            <pc:sldMk cId="289368279" sldId="257"/>
-            <ac:picMk id="16" creationId="{957F6AC8-9B00-19B9-C125-4F14E0145E3D}"/>
-          </ac:picMkLst>
-        </pc:picChg>
-      </pc:sldChg>
-      <pc:sldChg chg="addSp delSp modSp">
-        <pc:chgData name="Luis guilherme De barros andrade faria" userId="S::luis.faria@student.torrens.edu.au::31e40991-e7d9-41d2-8af0-eeeeb0b0a000" providerId="AD" clId="Web-{4C6DD4A7-F0FB-8405-FC1A-6AA07854EB2A}" dt="2025-08-09T23:04:55.013" v="402" actId="20577"/>
-        <pc:sldMkLst>
-          <pc:docMk/>
-          <pc:sldMk cId="1725121888" sldId="258"/>
-        </pc:sldMkLst>
-        <pc:spChg chg="mod">
-          <ac:chgData name="Luis guilherme De barros andrade faria" userId="S::luis.faria@student.torrens.edu.au::31e40991-e7d9-41d2-8af0-eeeeb0b0a000" providerId="AD" clId="Web-{4C6DD4A7-F0FB-8405-FC1A-6AA07854EB2A}" dt="2025-08-09T23:04:55.013" v="402" actId="20577"/>
-          <ac:spMkLst>
-            <pc:docMk/>
-            <pc:sldMk cId="1725121888" sldId="258"/>
-            <ac:spMk id="3" creationId="{97DC1AB1-7DF5-8EF4-396D-AA56EEF2D41D}"/>
-          </ac:spMkLst>
-        </pc:spChg>
-        <pc:spChg chg="add mod">
-          <ac:chgData name="Luis guilherme De barros andrade faria" userId="S::luis.faria@student.torrens.edu.au::31e40991-e7d9-41d2-8af0-eeeeb0b0a000" providerId="AD" clId="Web-{4C6DD4A7-F0FB-8405-FC1A-6AA07854EB2A}" dt="2025-08-09T23:03:50.216" v="391" actId="20577"/>
-          <ac:spMkLst>
-            <pc:docMk/>
-            <pc:sldMk cId="1725121888" sldId="258"/>
-            <ac:spMk id="9" creationId="{0C85DDB4-31C9-3E0C-D601-62D8765AEE39}"/>
-          </ac:spMkLst>
-        </pc:spChg>
-        <pc:picChg chg="add mod">
-          <ac:chgData name="Luis guilherme De barros andrade faria" userId="S::luis.faria@student.torrens.edu.au::31e40991-e7d9-41d2-8af0-eeeeb0b0a000" providerId="AD" clId="Web-{4C6DD4A7-F0FB-8405-FC1A-6AA07854EB2A}" dt="2025-08-09T23:03:15.232" v="383" actId="1076"/>
-          <ac:picMkLst>
-            <pc:docMk/>
-            <pc:sldMk cId="1725121888" sldId="258"/>
-            <ac:picMk id="12" creationId="{903B7DF6-01F2-DCC7-6D98-68646E54F310}"/>
-          </ac:picMkLst>
-        </pc:picChg>
-      </pc:sldChg>
-    </pc:docChg>
-  </pc:docChgLst>
-  <pc:docChgLst>
-    <pc:chgData name="Luis guilherme De barros andrade faria" userId="S::luis.faria@student.torrens.edu.au::31e40991-e7d9-41d2-8af0-eeeeb0b0a000" providerId="AD" clId="Web-{9DCF803B-1879-3C87-2594-52E0C2377D7A}"/>
-    <pc:docChg chg="modSld">
-      <pc:chgData name="Luis guilherme De barros andrade faria" userId="S::luis.faria@student.torrens.edu.au::31e40991-e7d9-41d2-8af0-eeeeb0b0a000" providerId="AD" clId="Web-{9DCF803B-1879-3C87-2594-52E0C2377D7A}" dt="2025-07-30T09:20:58.648" v="123"/>
-      <pc:docMkLst>
-        <pc:docMk/>
-      </pc:docMkLst>
-      <pc:sldChg chg="addSp delSp modSp mod setClrOvrMap">
-        <pc:chgData name="Luis guilherme De barros andrade faria" userId="S::luis.faria@student.torrens.edu.au::31e40991-e7d9-41d2-8af0-eeeeb0b0a000" providerId="AD" clId="Web-{9DCF803B-1879-3C87-2594-52E0C2377D7A}" dt="2025-07-30T09:20:58.648" v="123"/>
-        <pc:sldMkLst>
-          <pc:docMk/>
-          <pc:sldMk cId="109857222" sldId="256"/>
-        </pc:sldMkLst>
-        <pc:spChg chg="mod">
-          <ac:chgData name="Luis guilherme De barros andrade faria" userId="S::luis.faria@student.torrens.edu.au::31e40991-e7d9-41d2-8af0-eeeeb0b0a000" providerId="AD" clId="Web-{9DCF803B-1879-3C87-2594-52E0C2377D7A}" dt="2025-07-30T09:20:58.648" v="123"/>
-          <ac:spMkLst>
-            <pc:docMk/>
-            <pc:sldMk cId="109857222" sldId="256"/>
-            <ac:spMk id="2" creationId="{00000000-0000-0000-0000-000000000000}"/>
-          </ac:spMkLst>
-        </pc:spChg>
-        <pc:spChg chg="mod">
-          <ac:chgData name="Luis guilherme De barros andrade faria" userId="S::luis.faria@student.torrens.edu.au::31e40991-e7d9-41d2-8af0-eeeeb0b0a000" providerId="AD" clId="Web-{9DCF803B-1879-3C87-2594-52E0C2377D7A}" dt="2025-07-30T09:20:58.648" v="123"/>
-          <ac:spMkLst>
-            <pc:docMk/>
-            <pc:sldMk cId="109857222" sldId="256"/>
-            <ac:spMk id="3" creationId="{00000000-0000-0000-0000-000000000000}"/>
-          </ac:spMkLst>
-        </pc:spChg>
-      </pc:sldChg>
-    </pc:docChg>
-  </pc:docChgLst>
-  <pc:docChgLst>
-    <pc:chgData name="Luis guilherme De barros andrade faria" userId="S::luis.faria@student.torrens.edu.au::31e40991-e7d9-41d2-8af0-eeeeb0b0a000" providerId="AD" clId="Web-{1B474463-4B51-4B51-0CD9-7CD63D0062D9}"/>
-    <pc:docChg chg="modSld">
-      <pc:chgData name="Luis guilherme De barros andrade faria" userId="S::luis.faria@student.torrens.edu.au::31e40991-e7d9-41d2-8af0-eeeeb0b0a000" providerId="AD" clId="Web-{1B474463-4B51-4B51-0CD9-7CD63D0062D9}" dt="2025-08-10T00:53:42.660" v="208" actId="14100"/>
-      <pc:docMkLst>
-        <pc:docMk/>
-      </pc:docMkLst>
-      <pc:sldChg chg="modSp">
-        <pc:chgData name="Luis guilherme De barros andrade faria" userId="S::luis.faria@student.torrens.edu.au::31e40991-e7d9-41d2-8af0-eeeeb0b0a000" providerId="AD" clId="Web-{1B474463-4B51-4B51-0CD9-7CD63D0062D9}" dt="2025-08-10T00:53:42.660" v="208" actId="14100"/>
-        <pc:sldMkLst>
-          <pc:docMk/>
-          <pc:sldMk cId="109857222" sldId="256"/>
-        </pc:sldMkLst>
-        <pc:spChg chg="mod">
-          <ac:chgData name="Luis guilherme De barros andrade faria" userId="S::luis.faria@student.torrens.edu.au::31e40991-e7d9-41d2-8af0-eeeeb0b0a000" providerId="AD" clId="Web-{1B474463-4B51-4B51-0CD9-7CD63D0062D9}" dt="2025-08-10T00:53:42.660" v="208" actId="14100"/>
-          <ac:spMkLst>
-            <pc:docMk/>
-            <pc:sldMk cId="109857222" sldId="256"/>
-            <ac:spMk id="3" creationId="{00000000-0000-0000-0000-000000000000}"/>
-          </ac:spMkLst>
-        </pc:spChg>
-      </pc:sldChg>
-      <pc:sldChg chg="addSp delSp modSp">
-        <pc:chgData name="Luis guilherme De barros andrade faria" userId="S::luis.faria@student.torrens.edu.au::31e40991-e7d9-41d2-8af0-eeeeb0b0a000" providerId="AD" clId="Web-{1B474463-4B51-4B51-0CD9-7CD63D0062D9}" dt="2025-08-10T00:41:11.072" v="24" actId="1076"/>
-        <pc:sldMkLst>
-          <pc:docMk/>
-          <pc:sldMk cId="2969302973" sldId="259"/>
-        </pc:sldMkLst>
-        <pc:spChg chg="mod">
-          <ac:chgData name="Luis guilherme De barros andrade faria" userId="S::luis.faria@student.torrens.edu.au::31e40991-e7d9-41d2-8af0-eeeeb0b0a000" providerId="AD" clId="Web-{1B474463-4B51-4B51-0CD9-7CD63D0062D9}" dt="2025-08-10T00:40:34.461" v="21" actId="20577"/>
-          <ac:spMkLst>
-            <pc:docMk/>
-            <pc:sldMk cId="2969302973" sldId="259"/>
-            <ac:spMk id="3" creationId="{128842BA-4FD2-5DE1-4327-85AE2A9AC27A}"/>
-          </ac:spMkLst>
-        </pc:spChg>
-      </pc:sldChg>
-      <pc:sldChg chg="addSp delSp modSp">
-        <pc:chgData name="Luis guilherme De barros andrade faria" userId="S::luis.faria@student.torrens.edu.au::31e40991-e7d9-41d2-8af0-eeeeb0b0a000" providerId="AD" clId="Web-{1B474463-4B51-4B51-0CD9-7CD63D0062D9}" dt="2025-08-10T00:48:08.935" v="109"/>
-        <pc:sldMkLst>
-          <pc:docMk/>
-          <pc:sldMk cId="156018877" sldId="260"/>
-        </pc:sldMkLst>
-        <pc:spChg chg="mod">
-          <ac:chgData name="Luis guilherme De barros andrade faria" userId="S::luis.faria@student.torrens.edu.au::31e40991-e7d9-41d2-8af0-eeeeb0b0a000" providerId="AD" clId="Web-{1B474463-4B51-4B51-0CD9-7CD63D0062D9}" dt="2025-08-10T00:42:56.182" v="36" actId="20577"/>
-          <ac:spMkLst>
-            <pc:docMk/>
-            <pc:sldMk cId="156018877" sldId="260"/>
-            <ac:spMk id="2" creationId="{95B6250B-0DB2-6DBF-6048-D67F8068EEBC}"/>
-          </ac:spMkLst>
-        </pc:spChg>
-        <pc:spChg chg="mod">
-          <ac:chgData name="Luis guilherme De barros andrade faria" userId="S::luis.faria@student.torrens.edu.au::31e40991-e7d9-41d2-8af0-eeeeb0b0a000" providerId="AD" clId="Web-{1B474463-4B51-4B51-0CD9-7CD63D0062D9}" dt="2025-08-10T00:43:58.604" v="61"/>
-          <ac:spMkLst>
-            <pc:docMk/>
-            <pc:sldMk cId="156018877" sldId="260"/>
-            <ac:spMk id="3" creationId="{8D37C389-CD99-F4C6-44EB-BAAD0A52FCBD}"/>
-          </ac:spMkLst>
-        </pc:spChg>
-        <pc:picChg chg="add mod">
-          <ac:chgData name="Luis guilherme De barros andrade faria" userId="S::luis.faria@student.torrens.edu.au::31e40991-e7d9-41d2-8af0-eeeeb0b0a000" providerId="AD" clId="Web-{1B474463-4B51-4B51-0CD9-7CD63D0062D9}" dt="2025-08-10T00:43:54.088" v="60" actId="1076"/>
-          <ac:picMkLst>
-            <pc:docMk/>
-            <pc:sldMk cId="156018877" sldId="260"/>
-            <ac:picMk id="5" creationId="{6341FAA9-2C48-0FCB-8E59-D4C00C358489}"/>
-          </ac:picMkLst>
-        </pc:picChg>
-      </pc:sldChg>
-      <pc:sldChg chg="addSp delSp modSp mod setBg">
-        <pc:chgData name="Luis guilherme De barros andrade faria" userId="S::luis.faria@student.torrens.edu.au::31e40991-e7d9-41d2-8af0-eeeeb0b0a000" providerId="AD" clId="Web-{1B474463-4B51-4B51-0CD9-7CD63D0062D9}" dt="2025-08-10T00:49:14.404" v="121"/>
-        <pc:sldMkLst>
-          <pc:docMk/>
-          <pc:sldMk cId="1083875465" sldId="261"/>
-        </pc:sldMkLst>
-        <pc:spChg chg="mod">
-          <ac:chgData name="Luis guilherme De barros andrade faria" userId="S::luis.faria@student.torrens.edu.au::31e40991-e7d9-41d2-8af0-eeeeb0b0a000" providerId="AD" clId="Web-{1B474463-4B51-4B51-0CD9-7CD63D0062D9}" dt="2025-08-10T00:47:40.060" v="96"/>
-          <ac:spMkLst>
-            <pc:docMk/>
-            <pc:sldMk cId="1083875465" sldId="261"/>
-            <ac:spMk id="2" creationId="{0F13DB09-CB71-EE4C-BA4D-E6FF35A4CF9A}"/>
-          </ac:spMkLst>
-        </pc:spChg>
-        <pc:spChg chg="mod ord">
-          <ac:chgData name="Luis guilherme De barros andrade faria" userId="S::luis.faria@student.torrens.edu.au::31e40991-e7d9-41d2-8af0-eeeeb0b0a000" providerId="AD" clId="Web-{1B474463-4B51-4B51-0CD9-7CD63D0062D9}" dt="2025-08-10T00:47:40.060" v="96"/>
-          <ac:spMkLst>
-            <pc:docMk/>
-            <pc:sldMk cId="1083875465" sldId="261"/>
-            <ac:spMk id="3" creationId="{F50607A3-6501-9AFC-CA09-5BB6CC46E19B}"/>
-          </ac:spMkLst>
-        </pc:spChg>
-        <pc:spChg chg="add mod ord">
-          <ac:chgData name="Luis guilherme De barros andrade faria" userId="S::luis.faria@student.torrens.edu.au::31e40991-e7d9-41d2-8af0-eeeeb0b0a000" providerId="AD" clId="Web-{1B474463-4B51-4B51-0CD9-7CD63D0062D9}" dt="2025-08-10T00:49:14.404" v="121"/>
-          <ac:spMkLst>
-            <pc:docMk/>
-            <pc:sldMk cId="1083875465" sldId="261"/>
-            <ac:spMk id="10" creationId="{6C34FB37-4C9A-584A-859E-81489347EF02}"/>
-          </ac:spMkLst>
-        </pc:spChg>
-        <pc:spChg chg="add">
-          <ac:chgData name="Luis guilherme De barros andrade faria" userId="S::luis.faria@student.torrens.edu.au::31e40991-e7d9-41d2-8af0-eeeeb0b0a000" providerId="AD" clId="Web-{1B474463-4B51-4B51-0CD9-7CD63D0062D9}" dt="2025-08-10T00:47:40.060" v="96"/>
-          <ac:spMkLst>
-            <pc:docMk/>
-            <pc:sldMk cId="1083875465" sldId="261"/>
-            <ac:spMk id="13" creationId="{E53615EE-C559-4E03-999B-5477F1626FE5}"/>
-          </ac:spMkLst>
-        </pc:spChg>
-        <pc:picChg chg="add mod">
-          <ac:chgData name="Luis guilherme De barros andrade faria" userId="S::luis.faria@student.torrens.edu.au::31e40991-e7d9-41d2-8af0-eeeeb0b0a000" providerId="AD" clId="Web-{1B474463-4B51-4B51-0CD9-7CD63D0062D9}" dt="2025-08-10T00:47:58.420" v="105" actId="1076"/>
-          <ac:picMkLst>
-            <pc:docMk/>
-            <pc:sldMk cId="1083875465" sldId="261"/>
-            <ac:picMk id="6" creationId="{27D04648-2C56-9A86-44F2-B12C71C1D72D}"/>
-          </ac:picMkLst>
-        </pc:picChg>
-        <pc:picChg chg="add">
-          <ac:chgData name="Luis guilherme De barros andrade faria" userId="S::luis.faria@student.torrens.edu.au::31e40991-e7d9-41d2-8af0-eeeeb0b0a000" providerId="AD" clId="Web-{1B474463-4B51-4B51-0CD9-7CD63D0062D9}" dt="2025-08-10T00:48:10.341" v="110"/>
-          <ac:picMkLst>
-            <pc:docMk/>
-            <pc:sldMk cId="1083875465" sldId="261"/>
-            <ac:picMk id="9" creationId="{19E7FECC-D929-BDBF-4D1A-360456E5A0CC}"/>
-          </ac:picMkLst>
-        </pc:picChg>
-        <pc:cxnChg chg="add">
-          <ac:chgData name="Luis guilherme De barros andrade faria" userId="S::luis.faria@student.torrens.edu.au::31e40991-e7d9-41d2-8af0-eeeeb0b0a000" providerId="AD" clId="Web-{1B474463-4B51-4B51-0CD9-7CD63D0062D9}" dt="2025-08-10T00:47:40.060" v="96"/>
-          <ac:cxnSpMkLst>
-            <pc:docMk/>
-            <pc:sldMk cId="1083875465" sldId="261"/>
-            <ac:cxnSpMk id="15" creationId="{799A8EBD-049C-48E6-97ED-C9102D78FC79}"/>
-          </ac:cxnSpMkLst>
-        </pc:cxnChg>
-      </pc:sldChg>
-      <pc:sldChg chg="addSp delSp modSp">
-        <pc:chgData name="Luis guilherme De barros andrade faria" userId="S::luis.faria@student.torrens.edu.au::31e40991-e7d9-41d2-8af0-eeeeb0b0a000" providerId="AD" clId="Web-{1B474463-4B51-4B51-0CD9-7CD63D0062D9}" dt="2025-08-10T00:51:25.842" v="148" actId="1076"/>
-        <pc:sldMkLst>
-          <pc:docMk/>
-          <pc:sldMk cId="2354179793" sldId="262"/>
-        </pc:sldMkLst>
-        <pc:spChg chg="mod">
-          <ac:chgData name="Luis guilherme De barros andrade faria" userId="S::luis.faria@student.torrens.edu.au::31e40991-e7d9-41d2-8af0-eeeeb0b0a000" providerId="AD" clId="Web-{1B474463-4B51-4B51-0CD9-7CD63D0062D9}" dt="2025-08-10T00:50:30.529" v="128" actId="1076"/>
-          <ac:spMkLst>
-            <pc:docMk/>
-            <pc:sldMk cId="2354179793" sldId="262"/>
-            <ac:spMk id="2" creationId="{955AA314-AE02-4230-8EE1-5D7B0D6D4ACB}"/>
-          </ac:spMkLst>
-        </pc:spChg>
-      </pc:sldChg>
-      <pc:sldChg chg="modSp">
-        <pc:chgData name="Luis guilherme De barros andrade faria" userId="S::luis.faria@student.torrens.edu.au::31e40991-e7d9-41d2-8af0-eeeeb0b0a000" providerId="AD" clId="Web-{1B474463-4B51-4B51-0CD9-7CD63D0062D9}" dt="2025-08-10T00:52:42.451" v="193" actId="14100"/>
-        <pc:sldMkLst>
-          <pc:docMk/>
-          <pc:sldMk cId="2107877928" sldId="263"/>
-        </pc:sldMkLst>
-        <pc:spChg chg="mod">
-          <ac:chgData name="Luis guilherme De barros andrade faria" userId="S::luis.faria@student.torrens.edu.au::31e40991-e7d9-41d2-8af0-eeeeb0b0a000" providerId="AD" clId="Web-{1B474463-4B51-4B51-0CD9-7CD63D0062D9}" dt="2025-08-10T00:52:42.451" v="193" actId="14100"/>
-          <ac:spMkLst>
-            <pc:docMk/>
-            <pc:sldMk cId="2107877928" sldId="263"/>
-            <ac:spMk id="3" creationId="{AFF252BB-3FA2-0F8C-5CDD-FFADE079B4AB}"/>
-          </ac:spMkLst>
-        </pc:spChg>
-      </pc:sldChg>
-    </pc:docChg>
-  </pc:docChgLst>
-</pc:chgInfo>
 </file>
 
 <file path=ppt/diagrams/colors1.xml><?xml version="1.0" encoding="utf-8"?>
@@ -7277,7 +5347,7 @@
           <a:p>
             <a:fld id="{D1D1EADE-8E88-4C7C-8AC5-FB148DE4940E}" type="datetime1">
               <a:rPr lang="en-US" smtClean="0"/>
-              <a:t>8/13/25</a:t>
+              <a:t>8/19/25</a:t>
             </a:fld>
             <a:endParaRPr lang="en-US"/>
           </a:p>
@@ -7475,7 +5545,7 @@
           <a:p>
             <a:fld id="{EC3C8B9C-477D-492A-96AD-1FC2CC997A73}" type="datetime1">
               <a:rPr lang="en-US" smtClean="0"/>
-              <a:t>8/13/25</a:t>
+              <a:t>8/19/25</a:t>
             </a:fld>
             <a:endParaRPr lang="en-US"/>
           </a:p>
@@ -7683,7 +5753,7 @@
           <a:p>
             <a:fld id="{42D3AED5-E26D-4E29-B1B3-7847B6779594}" type="datetime1">
               <a:rPr lang="en-US" smtClean="0"/>
-              <a:t>8/13/25</a:t>
+              <a:t>8/19/25</a:t>
             </a:fld>
             <a:endParaRPr lang="en-US"/>
           </a:p>
@@ -7881,7 +5951,7 @@
           <a:p>
             <a:fld id="{157B6794-849E-4626-908B-D15793550EFB}" type="datetime1">
               <a:rPr lang="en-US" smtClean="0"/>
-              <a:t>8/13/25</a:t>
+              <a:t>8/19/25</a:t>
             </a:fld>
             <a:endParaRPr lang="en-US"/>
           </a:p>
@@ -8156,7 +6226,7 @@
           <a:p>
             <a:fld id="{63DB64E7-5594-42A3-ADBF-E95A7ACEAD64}" type="datetime1">
               <a:rPr lang="en-US" smtClean="0"/>
-              <a:t>8/13/25</a:t>
+              <a:t>8/19/25</a:t>
             </a:fld>
             <a:endParaRPr lang="en-US"/>
           </a:p>
@@ -8426,7 +6496,7 @@
           <a:p>
             <a:fld id="{18462B0B-D248-4FFB-8695-AD7FA4B1284A}" type="datetime1">
               <a:rPr lang="en-US" smtClean="0"/>
-              <a:t>8/13/25</a:t>
+              <a:t>8/19/25</a:t>
             </a:fld>
             <a:endParaRPr lang="en-US"/>
           </a:p>
@@ -8846,7 +6916,7 @@
           <a:p>
             <a:fld id="{D0378EFB-9159-4510-B73F-4F0409ADE937}" type="datetime1">
               <a:rPr lang="en-US" smtClean="0"/>
-              <a:t>8/13/25</a:t>
+              <a:t>8/19/25</a:t>
             </a:fld>
             <a:endParaRPr lang="en-US"/>
           </a:p>
@@ -8987,7 +7057,7 @@
           <a:p>
             <a:fld id="{89BC9412-2452-4BED-A324-9D8C115361AD}" type="datetime1">
               <a:rPr lang="en-US" smtClean="0"/>
-              <a:t>8/13/25</a:t>
+              <a:t>8/19/25</a:t>
             </a:fld>
             <a:endParaRPr lang="en-US"/>
           </a:p>
@@ -9100,7 +7170,7 @@
           <a:p>
             <a:fld id="{F5318F62-D251-40E8-A23C-F4CFE9FEAB41}" type="datetime1">
               <a:rPr lang="en-US" smtClean="0"/>
-              <a:t>8/13/25</a:t>
+              <a:t>8/19/25</a:t>
             </a:fld>
             <a:endParaRPr lang="en-US"/>
           </a:p>
@@ -9411,7 +7481,7 @@
           <a:p>
             <a:fld id="{44F76144-149E-4874-93A5-554A0357CF82}" type="datetime1">
               <a:rPr lang="en-US" smtClean="0"/>
-              <a:t>8/13/25</a:t>
+              <a:t>8/19/25</a:t>
             </a:fld>
             <a:endParaRPr lang="en-US"/>
           </a:p>
@@ -9702,7 +7772,7 @@
           <a:p>
             <a:fld id="{50BA65D8-0540-4835-AE5C-25D29DBA01BE}" type="datetime1">
               <a:rPr lang="en-US" smtClean="0"/>
-              <a:t>8/13/25</a:t>
+              <a:t>8/19/25</a:t>
             </a:fld>
             <a:endParaRPr lang="en-US"/>
           </a:p>
@@ -9942,7 +8012,7 @@
           <a:p>
             <a:fld id="{E31BA835-12AC-4E8F-955A-EA3F4DE2791F}" type="datetime1">
               <a:rPr lang="en-US" smtClean="0"/>
-              <a:t>8/13/25</a:t>
+              <a:t>8/19/25</a:t>
             </a:fld>
             <a:endParaRPr lang="en-US"/>
           </a:p>
@@ -12478,10 +10548,10 @@
       </p:sp>
       <p:pic>
         <p:nvPicPr>
-          <p:cNvPr id="12" name="Picture 11" descr="A screenshot of a computer&#10;&#10;AI-generated content may be incorrect.">
-            <a:extLst>
-              <a:ext uri="{FF2B5EF4-FFF2-40B4-BE49-F238E27FC236}">
-                <a16:creationId xmlns:a16="http://schemas.microsoft.com/office/drawing/2014/main" id="{903B7DF6-01F2-DCC7-6D98-68646E54F310}"/>
+          <p:cNvPr id="4" name="Picture 3" descr="A screenshot of a computer&#10;&#10;AI-generated content may be incorrect.">
+            <a:extLst>
+              <a:ext uri="{FF2B5EF4-FFF2-40B4-BE49-F238E27FC236}">
+                <a16:creationId xmlns:a16="http://schemas.microsoft.com/office/drawing/2014/main" id="{0BDF6C14-0DF6-BF29-DC90-CCCAE3DEDFB6}"/>
               </a:ext>
             </a:extLst>
           </p:cNvPr>
@@ -12498,8 +10568,8 @@
         </p:blipFill>
         <p:spPr>
           <a:xfrm>
-            <a:off x="696410" y="1563413"/>
-            <a:ext cx="6752700" cy="4480034"/>
+            <a:off x="705039" y="1697620"/>
+            <a:ext cx="6296731" cy="4851721"/>
           </a:xfrm>
           <a:prstGeom prst="rect">
             <a:avLst/>
@@ -16584,10 +14654,10 @@
       </p:pic>
       <p:pic>
         <p:nvPicPr>
-          <p:cNvPr id="5" name="Picture 4" descr="A screenshot of a computer&#10;&#10;AI-generated content may be incorrect.">
-            <a:extLst>
-              <a:ext uri="{FF2B5EF4-FFF2-40B4-BE49-F238E27FC236}">
-                <a16:creationId xmlns:a16="http://schemas.microsoft.com/office/drawing/2014/main" id="{6341FAA9-2C48-0FCB-8E59-D4C00C358489}"/>
+          <p:cNvPr id="4" name="Picture 3" descr="A screenshot of a computer&#10;&#10;AI-generated content may be incorrect.">
+            <a:extLst>
+              <a:ext uri="{FF2B5EF4-FFF2-40B4-BE49-F238E27FC236}">
+                <a16:creationId xmlns:a16="http://schemas.microsoft.com/office/drawing/2014/main" id="{AA64AE96-B651-D428-9032-D824BCDDC19F}"/>
               </a:ext>
             </a:extLst>
           </p:cNvPr>
@@ -16604,8 +14674,8 @@
         </p:blipFill>
         <p:spPr>
           <a:xfrm>
-            <a:off x="3562296" y="844378"/>
-            <a:ext cx="7569655" cy="5169243"/>
+            <a:off x="3572074" y="782876"/>
+            <a:ext cx="6905880" cy="5323563"/>
           </a:xfrm>
           <a:prstGeom prst="rect">
             <a:avLst/>

</xml_diff>